<commit_message>
Added changes in Poster
</commit_message>
<xml_diff>
--- a/Final project/Poster.pptx
+++ b/Final project/Poster.pptx
@@ -1438,7 +1438,7 @@
   <dgm:whole/>
   <dgm:extLst>
     <a:ext uri="http://schemas.microsoft.com/office/drawing/2008/diagram">
-      <dsp:dataModelExt xmlns:dsp="http://schemas.microsoft.com/office/drawing/2008/diagram" relId="rId19" minVer="http://schemas.openxmlformats.org/drawingml/2006/diagram"/>
+      <dsp:dataModelExt xmlns:dsp="http://schemas.microsoft.com/office/drawing/2008/diagram" relId="rId17" minVer="http://schemas.openxmlformats.org/drawingml/2006/diagram"/>
     </a:ext>
     <a:ext uri="{C62137D5-CB1D-491B-B009-E17868A290BF}">
       <dgm14:recolorImg xmlns:dgm14="http://schemas.microsoft.com/office/drawing/2010/diagram" val="1"/>
@@ -7234,9 +7234,9 @@
         <p:grpSpPr>
           <a:xfrm>
             <a:off x="613750" y="3961535"/>
-            <a:ext cx="9601200" cy="15305178"/>
+            <a:ext cx="9601200" cy="15917100"/>
             <a:chOff x="576544" y="12808367"/>
-            <a:chExt cx="12227390" cy="25061364"/>
+            <a:chExt cx="12227390" cy="26063345"/>
           </a:xfrm>
         </p:grpSpPr>
         <p:sp>
@@ -7247,8 +7247,8 @@
           </p:nvSpPr>
           <p:spPr>
             <a:xfrm>
-              <a:off x="581844" y="14132898"/>
-              <a:ext cx="12222090" cy="23736833"/>
+              <a:off x="581844" y="14227745"/>
+              <a:ext cx="12222090" cy="24643967"/>
             </a:xfrm>
             <a:prstGeom prst="rect">
               <a:avLst/>
@@ -7260,20 +7260,79 @@
             </a:bodyPr>
             <a:lstStyle/>
             <a:p>
-              <a:pPr algn="just">
+              <a:pPr marL="571500" indent="-571500" algn="just">
                 <a:spcBef>
                   <a:spcPts val="0"/>
                 </a:spcBef>
                 <a:spcAft>
                   <a:spcPts val="0"/>
                 </a:spcAft>
+                <a:buFont typeface="Wingdings" panose="05000000000000000000" pitchFamily="2" charset="2"/>
+                <a:buChar char="Ø"/>
               </a:pPr>
               <a:r>
                 <a:rPr lang="en-US" sz="3600" dirty="0">
                   <a:latin typeface="+mj-lt"/>
                   <a:cs typeface="Arial" panose="020B0604020202020204" pitchFamily="34" charset="0"/>
                 </a:rPr>
-                <a:t>Due to the development of experimental and analytic equipment, large amounts of scientific data are being produced all over the world. The rapidly increasing volume and variety of geoscience-related data give researchers opportunities to answer scientific questions that are hard to solve using traditional methods. However, most of the time, raw data are not directly usable because of their hierarchical structures, missing values, inaccuracy, duplication, and so on. Also the data format needs to be adapted to different analytic techniques. It is often said that 80% time of data analytics is spent on data cleaning and preparing. Therefore, data processing is a crucial part of the data analytics pipeline, and iterative processing is needed when new problems emerge or secondary data are generated, throughout the whole analytics procedure. This poster will mainly focus on data processing and preparation. We start by introducing the principles for cleaning datasets, followed by some quick data exploration methods. Then we demonstrate some ways of dealing with various problems, such as missing values or duplication, in the datasets. The last part of the presentation show applications in real geoscientific datasets.</a:t>
+                <a:t>In this world of rapid development, having a perfect health directly means leading a productive life. While prevention is better than cure, there are some cases where some serious, unexpected things happen which require immediate action. In those scenarios it is crucial to provide immediate responses to such emergencies as they could turn out be a lifesaver. </a:t>
+              </a:r>
+            </a:p>
+            <a:p>
+              <a:pPr marL="571500" indent="-571500" algn="just">
+                <a:spcBef>
+                  <a:spcPts val="0"/>
+                </a:spcBef>
+                <a:spcAft>
+                  <a:spcPts val="0"/>
+                </a:spcAft>
+                <a:buFont typeface="Wingdings" panose="05000000000000000000" pitchFamily="2" charset="2"/>
+                <a:buChar char="Ø"/>
+              </a:pPr>
+              <a:r>
+                <a:rPr lang="en-US" sz="3600" dirty="0">
+                  <a:latin typeface="+mj-lt"/>
+                  <a:cs typeface="Arial" panose="020B0604020202020204" pitchFamily="34" charset="0"/>
+                </a:rPr>
+                <a:t>Another such life saving action is to provide the pre-hospital care to any patient present in an ambulance or waiting for one. Therefore, having an accurate arrival time of ambulance could be very helpful. </a:t>
+              </a:r>
+            </a:p>
+            <a:p>
+              <a:pPr marL="571500" indent="-571500" algn="just">
+                <a:spcBef>
+                  <a:spcPts val="0"/>
+                </a:spcBef>
+                <a:spcAft>
+                  <a:spcPts val="0"/>
+                </a:spcAft>
+                <a:buFont typeface="Wingdings" panose="05000000000000000000" pitchFamily="2" charset="2"/>
+                <a:buChar char="Ø"/>
+              </a:pPr>
+              <a:r>
+                <a:rPr lang="en-US" sz="3600" dirty="0">
+                  <a:latin typeface="+mj-lt"/>
+                  <a:cs typeface="Arial" panose="020B0604020202020204" pitchFamily="34" charset="0"/>
+                </a:rPr>
+                <a:t>This project covers process of building a machine learning model that predicts a response time of any ambulance in relation with the weather on that day.</a:t>
+              </a:r>
+            </a:p>
+            <a:p>
+              <a:pPr marL="571500" indent="-571500" algn="just">
+                <a:spcBef>
+                  <a:spcPts val="0"/>
+                </a:spcBef>
+                <a:spcAft>
+                  <a:spcPts val="0"/>
+                </a:spcAft>
+                <a:buFont typeface="Wingdings" panose="05000000000000000000" pitchFamily="2" charset="2"/>
+                <a:buChar char="Ø"/>
+              </a:pPr>
+              <a:r>
+                <a:rPr lang="en-US" sz="3600" dirty="0">
+                  <a:latin typeface="+mj-lt"/>
+                  <a:cs typeface="Arial" panose="020B0604020202020204" pitchFamily="34" charset="0"/>
+                </a:rPr>
+                <a:t>This poster mainly covers details about the datasets in focus, what are the steps that are to be followed to get the data ready for any model building or evaluation. It also covers some of the plots which helps identify the relation between variables and finally contains the results and the conclusion drawn out from those results.</a:t>
               </a:r>
             </a:p>
           </p:txBody>
@@ -8182,7 +8241,7 @@
         </p:nvGrpSpPr>
         <p:grpSpPr>
           <a:xfrm>
-            <a:off x="624681" y="19553237"/>
+            <a:off x="624681" y="19477037"/>
             <a:ext cx="9605363" cy="5943600"/>
             <a:chOff x="576544" y="12808369"/>
             <a:chExt cx="12227388" cy="9732306"/>
@@ -8516,10 +8575,10 @@
         </p:nvGrpSpPr>
         <p:grpSpPr>
           <a:xfrm>
-            <a:off x="10683904" y="3961026"/>
-            <a:ext cx="19743164" cy="1876212"/>
+            <a:off x="10683904" y="3961028"/>
+            <a:ext cx="19743164" cy="1399651"/>
             <a:chOff x="576544" y="12808366"/>
-            <a:chExt cx="25132554" cy="3072191"/>
+            <a:chExt cx="25132554" cy="2291849"/>
           </a:xfrm>
         </p:grpSpPr>
         <p:sp>
@@ -8536,8 +8595,8 @@
           </p:nvSpPr>
           <p:spPr>
             <a:xfrm>
-              <a:off x="576544" y="14923021"/>
-              <a:ext cx="12222089" cy="957536"/>
+              <a:off x="576544" y="14225562"/>
+              <a:ext cx="12222089" cy="874653"/>
             </a:xfrm>
             <a:prstGeom prst="rect">
               <a:avLst/>
@@ -8549,20 +8608,22 @@
             </a:bodyPr>
             <a:lstStyle/>
             <a:p>
-              <a:pPr algn="ctr">
+              <a:pPr marL="571500" indent="-571500" algn="just">
                 <a:spcBef>
                   <a:spcPts val="0"/>
                 </a:spcBef>
                 <a:spcAft>
                   <a:spcPts val="0"/>
                 </a:spcAft>
+                <a:buFont typeface="Wingdings" panose="05000000000000000000" pitchFamily="2" charset="2"/>
+                <a:buChar char="Ø"/>
               </a:pPr>
               <a:r>
-                <a:rPr lang="en-US" sz="3200" dirty="0">
+                <a:rPr lang="en-US" sz="3600" dirty="0">
                   <a:latin typeface="+mj-lt"/>
                   <a:cs typeface="Arial" panose="020B0604020202020204" pitchFamily="34" charset="0"/>
                 </a:rPr>
-                <a:t>Data Preparation Steps:</a:t>
+                <a:t>Chart describing the data preparation steps:</a:t>
               </a:r>
             </a:p>
           </p:txBody>
@@ -8944,7 +9005,7 @@
                 <a:buFont typeface="Wingdings" panose="05000000000000000000" pitchFamily="2" charset="2"/>
                 <a:buChar char="v"/>
               </a:pPr>
-              <a:endParaRPr lang="en-US" sz="3600" dirty="0">
+              <a:endParaRPr lang="en-US" sz="2800" dirty="0">
                 <a:solidFill>
                   <a:schemeClr val="tx1"/>
                 </a:solidFill>
@@ -9334,1212 +9395,448 @@
           </a:prstGeom>
         </p:spPr>
       </p:pic>
-      <p:grpSp>
-        <p:nvGrpSpPr>
-          <p:cNvPr id="13" name="Group 12">
+      <p:sp>
+        <p:nvSpPr>
+          <p:cNvPr id="56" name="Rectangle 55">
             <a:extLst>
               <a:ext uri="{FF2B5EF4-FFF2-40B4-BE49-F238E27FC236}">
-                <a16:creationId xmlns:a16="http://schemas.microsoft.com/office/drawing/2014/main" id="{B7B65183-CAC5-717C-0D77-3167A0ACA75F}"/>
+                <a16:creationId xmlns:a16="http://schemas.microsoft.com/office/drawing/2014/main" id="{E5BF5720-C9F3-4E32-8C65-86290F280493}"/>
               </a:ext>
             </a:extLst>
           </p:cNvPr>
-          <p:cNvGrpSpPr/>
+          <p:cNvSpPr>
+            <a:spLocks/>
+          </p:cNvSpPr>
           <p:nvPr/>
-        </p:nvGrpSpPr>
-        <p:grpSpPr>
+        </p:nvSpPr>
+        <p:spPr bwMode="auto">
           <a:xfrm>
-            <a:off x="10530681" y="25565000"/>
-            <a:ext cx="10076148" cy="10513661"/>
-            <a:chOff x="476083" y="23646343"/>
-            <a:chExt cx="10076148" cy="10513661"/>
+            <a:off x="10699007" y="25565000"/>
+            <a:ext cx="9601200" cy="777240"/>
           </a:xfrm>
-        </p:grpSpPr>
-        <p:grpSp>
-          <p:nvGrpSpPr>
-            <p:cNvPr id="20" name="Group 19">
-              <a:extLst>
-                <a:ext uri="{FF2B5EF4-FFF2-40B4-BE49-F238E27FC236}">
-                  <a16:creationId xmlns:a16="http://schemas.microsoft.com/office/drawing/2014/main" id="{CF6D0D0B-6C01-565A-06C6-3A1AF3ACF35C}"/>
-                </a:ext>
-              </a:extLst>
-            </p:cNvPr>
-            <p:cNvGrpSpPr/>
-            <p:nvPr/>
-          </p:nvGrpSpPr>
-          <p:grpSpPr>
-            <a:xfrm>
-              <a:off x="644409" y="23646343"/>
-              <a:ext cx="9601200" cy="2431328"/>
-              <a:chOff x="576544" y="12808368"/>
-              <a:chExt cx="12222089" cy="3981163"/>
-            </a:xfrm>
-          </p:grpSpPr>
-          <p:sp>
-            <p:nvSpPr>
-              <p:cNvPr id="41" name="Rectangle 40">
-                <a:extLst>
-                  <a:ext uri="{FF2B5EF4-FFF2-40B4-BE49-F238E27FC236}">
-                    <a16:creationId xmlns:a16="http://schemas.microsoft.com/office/drawing/2014/main" id="{3AF42A2B-4354-017C-5D3B-EDD3F7EAE216}"/>
-                  </a:ext>
-                </a:extLst>
-              </p:cNvPr>
-              <p:cNvSpPr/>
-              <p:nvPr/>
-            </p:nvSpPr>
-            <p:spPr>
-              <a:xfrm>
-                <a:off x="576544" y="14219301"/>
-                <a:ext cx="12222089" cy="2570230"/>
-              </a:xfrm>
-              <a:prstGeom prst="rect">
-                <a:avLst/>
-              </a:prstGeom>
-            </p:spPr>
-            <p:txBody>
-              <a:bodyPr wrap="square">
-                <a:spAutoFit/>
-              </a:bodyPr>
-              <a:lstStyle/>
-              <a:p>
-                <a:pPr marL="457200" indent="-457200" algn="just">
-                  <a:spcBef>
-                    <a:spcPts val="0"/>
-                  </a:spcBef>
-                  <a:spcAft>
-                    <a:spcPts val="0"/>
-                  </a:spcAft>
-                  <a:buAutoNum type="arabicPeriod"/>
-                </a:pPr>
-                <a:r>
-                  <a:rPr lang="en-US" sz="3200" b="1" dirty="0">
-                    <a:solidFill>
-                      <a:srgbClr val="FF0000"/>
-                    </a:solidFill>
-                    <a:latin typeface="+mj-lt"/>
-                    <a:cs typeface="Arial" panose="020B0604020202020204" pitchFamily="34" charset="0"/>
-                  </a:rPr>
-                  <a:t>Each variable forms a column</a:t>
-                </a:r>
-              </a:p>
-              <a:p>
-                <a:pPr marL="457200" indent="-457200" algn="just">
-                  <a:spcBef>
-                    <a:spcPts val="0"/>
-                  </a:spcBef>
-                  <a:spcAft>
-                    <a:spcPts val="0"/>
-                  </a:spcAft>
-                  <a:buAutoNum type="arabicPeriod"/>
-                </a:pPr>
-                <a:r>
-                  <a:rPr lang="en-US" sz="3200" b="1" dirty="0">
-                    <a:solidFill>
-                      <a:srgbClr val="FF0000"/>
-                    </a:solidFill>
-                    <a:latin typeface="+mj-lt"/>
-                    <a:cs typeface="Arial" panose="020B0604020202020204" pitchFamily="34" charset="0"/>
-                  </a:rPr>
-                  <a:t>Each observation forms a row</a:t>
-                </a:r>
-              </a:p>
-              <a:p>
-                <a:pPr marL="457200" indent="-457200" algn="just">
-                  <a:spcBef>
-                    <a:spcPts val="0"/>
-                  </a:spcBef>
-                  <a:spcAft>
-                    <a:spcPts val="0"/>
-                  </a:spcAft>
-                  <a:buAutoNum type="arabicPeriod"/>
-                </a:pPr>
-                <a:r>
-                  <a:rPr lang="en-US" sz="3200" b="1" dirty="0">
-                    <a:solidFill>
-                      <a:srgbClr val="FF0000"/>
-                    </a:solidFill>
-                    <a:latin typeface="+mj-lt"/>
-                    <a:cs typeface="Arial" panose="020B0604020202020204" pitchFamily="34" charset="0"/>
-                  </a:rPr>
-                  <a:t>Each type of observational unit forms a table</a:t>
-                </a:r>
-              </a:p>
-            </p:txBody>
-          </p:sp>
-          <p:sp>
-            <p:nvSpPr>
-              <p:cNvPr id="56" name="Rectangle 55">
-                <a:extLst>
-                  <a:ext uri="{FF2B5EF4-FFF2-40B4-BE49-F238E27FC236}">
-                    <a16:creationId xmlns:a16="http://schemas.microsoft.com/office/drawing/2014/main" id="{E5BF5720-C9F3-4E32-8C65-86290F280493}"/>
-                  </a:ext>
-                </a:extLst>
-              </p:cNvPr>
-              <p:cNvSpPr>
-                <a:spLocks/>
-              </p:cNvSpPr>
-              <p:nvPr/>
-            </p:nvSpPr>
-            <p:spPr bwMode="auto">
-              <a:xfrm>
-                <a:off x="576544" y="12808368"/>
-                <a:ext cx="12222089" cy="1272687"/>
-              </a:xfrm>
-              <a:prstGeom prst="rect">
-                <a:avLst/>
-              </a:prstGeom>
-              <a:solidFill>
-                <a:srgbClr val="009999"/>
-              </a:solidFill>
-              <a:ln w="12700">
+          <a:prstGeom prst="rect">
+            <a:avLst/>
+          </a:prstGeom>
+          <a:solidFill>
+            <a:srgbClr val="009999"/>
+          </a:solidFill>
+          <a:ln w="12700">
+            <a:solidFill>
+              <a:srgbClr val="009999"/>
+            </a:solidFill>
+            <a:miter lim="800000"/>
+            <a:headEnd/>
+            <a:tailEnd/>
+          </a:ln>
+        </p:spPr>
+        <p:txBody>
+          <a:bodyPr lIns="0" tIns="0" rIns="0" bIns="0" anchor="ctr">
+            <a:prstTxWarp prst="textNoShape">
+              <a:avLst/>
+            </a:prstTxWarp>
+          </a:bodyPr>
+          <a:lstStyle>
+            <a:defPPr>
+              <a:defRPr lang="en-US"/>
+            </a:defPPr>
+            <a:lvl1pPr algn="l" rtl="0" fontAlgn="base">
+              <a:spcBef>
+                <a:spcPct val="0"/>
+              </a:spcBef>
+              <a:spcAft>
+                <a:spcPct val="0"/>
+              </a:spcAft>
+              <a:defRPr sz="2400" kern="1200">
                 <a:solidFill>
-                  <a:srgbClr val="009999"/>
+                  <a:srgbClr val="000000"/>
                 </a:solidFill>
-                <a:miter lim="800000"/>
-                <a:headEnd/>
-                <a:tailEnd/>
-              </a:ln>
-            </p:spPr>
-            <p:txBody>
-              <a:bodyPr lIns="0" tIns="0" rIns="0" bIns="0" anchor="ctr">
-                <a:prstTxWarp prst="textNoShape">
-                  <a:avLst/>
-                </a:prstTxWarp>
-              </a:bodyPr>
-              <a:lstStyle>
-                <a:defPPr>
-                  <a:defRPr lang="en-US"/>
-                </a:defPPr>
-                <a:lvl1pPr algn="l" rtl="0" fontAlgn="base">
-                  <a:spcBef>
-                    <a:spcPct val="0"/>
-                  </a:spcBef>
-                  <a:spcAft>
-                    <a:spcPct val="0"/>
-                  </a:spcAft>
-                  <a:defRPr sz="2400" kern="1200">
-                    <a:solidFill>
-                      <a:srgbClr val="000000"/>
-                    </a:solidFill>
-                    <a:latin typeface="Times" pitchFamily="-108" charset="0"/>
-                    <a:ea typeface="ヒラギノ明朝 ProN W3" pitchFamily="-108" charset="-128"/>
-                    <a:cs typeface="ヒラギノ明朝 ProN W3" pitchFamily="-108" charset="-128"/>
-                    <a:sym typeface="Times" pitchFamily="-108" charset="0"/>
-                  </a:defRPr>
-                </a:lvl1pPr>
-                <a:lvl2pPr marL="425224" indent="1482" algn="l" rtl="0" fontAlgn="base">
-                  <a:spcBef>
-                    <a:spcPct val="0"/>
-                  </a:spcBef>
-                  <a:spcAft>
-                    <a:spcPct val="0"/>
-                  </a:spcAft>
-                  <a:defRPr sz="2400" kern="1200">
-                    <a:solidFill>
-                      <a:srgbClr val="000000"/>
-                    </a:solidFill>
-                    <a:latin typeface="Times" pitchFamily="-108" charset="0"/>
-                    <a:ea typeface="ヒラギノ明朝 ProN W3" pitchFamily="-108" charset="-128"/>
-                    <a:cs typeface="ヒラギノ明朝 ProN W3" pitchFamily="-108" charset="-128"/>
-                    <a:sym typeface="Times" pitchFamily="-108" charset="0"/>
-                  </a:defRPr>
-                </a:lvl2pPr>
-                <a:lvl3pPr marL="851928" indent="1482" algn="l" rtl="0" fontAlgn="base">
-                  <a:spcBef>
-                    <a:spcPct val="0"/>
-                  </a:spcBef>
-                  <a:spcAft>
-                    <a:spcPct val="0"/>
-                  </a:spcAft>
-                  <a:defRPr sz="2400" kern="1200">
-                    <a:solidFill>
-                      <a:srgbClr val="000000"/>
-                    </a:solidFill>
-                    <a:latin typeface="Times" pitchFamily="-108" charset="0"/>
-                    <a:ea typeface="ヒラギノ明朝 ProN W3" pitchFamily="-108" charset="-128"/>
-                    <a:cs typeface="ヒラギノ明朝 ProN W3" pitchFamily="-108" charset="-128"/>
-                    <a:sym typeface="Times" pitchFamily="-108" charset="0"/>
-                  </a:defRPr>
-                </a:lvl3pPr>
-                <a:lvl4pPr marL="1278633" indent="1482" algn="l" rtl="0" fontAlgn="base">
-                  <a:spcBef>
-                    <a:spcPct val="0"/>
-                  </a:spcBef>
-                  <a:spcAft>
-                    <a:spcPct val="0"/>
-                  </a:spcAft>
-                  <a:defRPr sz="2400" kern="1200">
-                    <a:solidFill>
-                      <a:srgbClr val="000000"/>
-                    </a:solidFill>
-                    <a:latin typeface="Times" pitchFamily="-108" charset="0"/>
-                    <a:ea typeface="ヒラギノ明朝 ProN W3" pitchFamily="-108" charset="-128"/>
-                    <a:cs typeface="ヒラギノ明朝 ProN W3" pitchFamily="-108" charset="-128"/>
-                    <a:sym typeface="Times" pitchFamily="-108" charset="0"/>
-                  </a:defRPr>
-                </a:lvl4pPr>
-                <a:lvl5pPr marL="1705338" indent="1482" algn="l" rtl="0" fontAlgn="base">
-                  <a:spcBef>
-                    <a:spcPct val="0"/>
-                  </a:spcBef>
-                  <a:spcAft>
-                    <a:spcPct val="0"/>
-                  </a:spcAft>
-                  <a:defRPr sz="2400" kern="1200">
-                    <a:solidFill>
-                      <a:srgbClr val="000000"/>
-                    </a:solidFill>
-                    <a:latin typeface="Times" pitchFamily="-108" charset="0"/>
-                    <a:ea typeface="ヒラギノ明朝 ProN W3" pitchFamily="-108" charset="-128"/>
-                    <a:cs typeface="ヒラギノ明朝 ProN W3" pitchFamily="-108" charset="-128"/>
-                    <a:sym typeface="Times" pitchFamily="-108" charset="0"/>
-                  </a:defRPr>
-                </a:lvl5pPr>
-                <a:lvl6pPr marL="2133524" algn="l" defTabSz="426705" rtl="0" eaLnBrk="1" latinLnBrk="0" hangingPunct="1">
-                  <a:defRPr sz="2400" kern="1200">
-                    <a:solidFill>
-                      <a:srgbClr val="000000"/>
-                    </a:solidFill>
-                    <a:latin typeface="Times" pitchFamily="-108" charset="0"/>
-                    <a:ea typeface="ヒラギノ明朝 ProN W3" pitchFamily="-108" charset="-128"/>
-                    <a:cs typeface="ヒラギノ明朝 ProN W3" pitchFamily="-108" charset="-128"/>
-                    <a:sym typeface="Times" pitchFamily="-108" charset="0"/>
-                  </a:defRPr>
-                </a:lvl6pPr>
-                <a:lvl7pPr marL="2560229" algn="l" defTabSz="426705" rtl="0" eaLnBrk="1" latinLnBrk="0" hangingPunct="1">
-                  <a:defRPr sz="2400" kern="1200">
-                    <a:solidFill>
-                      <a:srgbClr val="000000"/>
-                    </a:solidFill>
-                    <a:latin typeface="Times" pitchFamily="-108" charset="0"/>
-                    <a:ea typeface="ヒラギノ明朝 ProN W3" pitchFamily="-108" charset="-128"/>
-                    <a:cs typeface="ヒラギノ明朝 ProN W3" pitchFamily="-108" charset="-128"/>
-                    <a:sym typeface="Times" pitchFamily="-108" charset="0"/>
-                  </a:defRPr>
-                </a:lvl7pPr>
-                <a:lvl8pPr marL="2986933" algn="l" defTabSz="426705" rtl="0" eaLnBrk="1" latinLnBrk="0" hangingPunct="1">
-                  <a:defRPr sz="2400" kern="1200">
-                    <a:solidFill>
-                      <a:srgbClr val="000000"/>
-                    </a:solidFill>
-                    <a:latin typeface="Times" pitchFamily="-108" charset="0"/>
-                    <a:ea typeface="ヒラギノ明朝 ProN W3" pitchFamily="-108" charset="-128"/>
-                    <a:cs typeface="ヒラギノ明朝 ProN W3" pitchFamily="-108" charset="-128"/>
-                    <a:sym typeface="Times" pitchFamily="-108" charset="0"/>
-                  </a:defRPr>
-                </a:lvl8pPr>
-                <a:lvl9pPr marL="3413638" algn="l" defTabSz="426705" rtl="0" eaLnBrk="1" latinLnBrk="0" hangingPunct="1">
-                  <a:defRPr sz="2400" kern="1200">
-                    <a:solidFill>
-                      <a:srgbClr val="000000"/>
-                    </a:solidFill>
-                    <a:latin typeface="Times" pitchFamily="-108" charset="0"/>
-                    <a:ea typeface="ヒラギノ明朝 ProN W3" pitchFamily="-108" charset="-128"/>
-                    <a:cs typeface="ヒラギノ明朝 ProN W3" pitchFamily="-108" charset="-128"/>
-                    <a:sym typeface="Times" pitchFamily="-108" charset="0"/>
-                  </a:defRPr>
-                </a:lvl9pPr>
-              </a:lstStyle>
-              <a:p>
-                <a:pPr algn="ctr">
-                  <a:lnSpc>
-                    <a:spcPct val="110000"/>
-                  </a:lnSpc>
-                  <a:tabLst>
-                    <a:tab pos="201793" algn="l"/>
-                    <a:tab pos="404492" algn="l"/>
-                    <a:tab pos="607190" algn="l"/>
-                    <a:tab pos="809888" algn="l"/>
-                    <a:tab pos="1012587" algn="l"/>
-                    <a:tab pos="1215286" algn="l"/>
-                    <a:tab pos="1417983" algn="l"/>
-                    <a:tab pos="1620682" algn="l"/>
-                    <a:tab pos="1823380" algn="l"/>
-                    <a:tab pos="2026078" algn="l"/>
-                    <a:tab pos="2228776" algn="l"/>
-                    <a:tab pos="2431475" algn="l"/>
-                  </a:tabLst>
-                </a:pPr>
-                <a:r>
-                  <a:rPr lang="en-US" sz="4400" b="1" dirty="0">
-                    <a:solidFill>
-                      <a:schemeClr val="bg1"/>
-                    </a:solidFill>
-                    <a:latin typeface="+mj-lt"/>
-                    <a:ea typeface="Verdana" pitchFamily="-108" charset="0"/>
-                    <a:cs typeface="Verdana" pitchFamily="-108" charset="0"/>
-                    <a:sym typeface="Verdana" pitchFamily="-108" charset="0"/>
-                  </a:rPr>
-                  <a:t>Results</a:t>
-                </a:r>
-                <a:r>
-                  <a:rPr lang="en-US" sz="4000" b="1" dirty="0">
-                    <a:solidFill>
-                      <a:schemeClr val="bg1"/>
-                    </a:solidFill>
-                    <a:latin typeface="+mj-lt"/>
-                    <a:ea typeface="Verdana" pitchFamily="-108" charset="0"/>
-                    <a:cs typeface="Verdana" pitchFamily="-108" charset="0"/>
-                    <a:sym typeface="Verdana" pitchFamily="-108" charset="0"/>
-                  </a:rPr>
-                  <a:t> </a:t>
-                </a:r>
-              </a:p>
-            </p:txBody>
-          </p:sp>
-        </p:grpSp>
-        <p:pic>
-          <p:nvPicPr>
-            <p:cNvPr id="30" name="Picture 29">
-              <a:extLst>
-                <a:ext uri="{FF2B5EF4-FFF2-40B4-BE49-F238E27FC236}">
-                  <a16:creationId xmlns:a16="http://schemas.microsoft.com/office/drawing/2014/main" id="{957B62A1-BDB4-FA59-DD3F-9607D47D4E9F}"/>
-                </a:ext>
-              </a:extLst>
-            </p:cNvPr>
-            <p:cNvPicPr>
-              <a:picLocks noChangeAspect="1"/>
-            </p:cNvPicPr>
-            <p:nvPr/>
-          </p:nvPicPr>
-          <p:blipFill>
-            <a:blip r:embed="rId7"/>
-            <a:stretch>
-              <a:fillRect/>
-            </a:stretch>
-          </p:blipFill>
-          <p:spPr>
-            <a:xfrm>
-              <a:off x="476083" y="26523090"/>
-              <a:ext cx="8317661" cy="2857211"/>
-            </a:xfrm>
-            <a:prstGeom prst="rect">
-              <a:avLst/>
-            </a:prstGeom>
-          </p:spPr>
-        </p:pic>
-        <p:pic>
-          <p:nvPicPr>
-            <p:cNvPr id="31" name="Picture 30">
-              <a:extLst>
-                <a:ext uri="{FF2B5EF4-FFF2-40B4-BE49-F238E27FC236}">
-                  <a16:creationId xmlns:a16="http://schemas.microsoft.com/office/drawing/2014/main" id="{DF7E3281-2699-43F0-5647-2C2C1BE4C6F4}"/>
-                </a:ext>
-              </a:extLst>
-            </p:cNvPr>
-            <p:cNvPicPr>
-              <a:picLocks noChangeAspect="1"/>
-            </p:cNvPicPr>
-            <p:nvPr/>
-          </p:nvPicPr>
-          <p:blipFill>
-            <a:blip r:embed="rId8"/>
-            <a:stretch>
-              <a:fillRect/>
-            </a:stretch>
-          </p:blipFill>
-          <p:spPr>
-            <a:xfrm>
-              <a:off x="1612895" y="29926263"/>
-              <a:ext cx="5644988" cy="4233741"/>
-            </a:xfrm>
-            <a:prstGeom prst="rect">
-              <a:avLst/>
-            </a:prstGeom>
-          </p:spPr>
-        </p:pic>
-        <p:sp>
-          <p:nvSpPr>
-            <p:cNvPr id="32" name="TextBox 31">
-              <a:extLst>
-                <a:ext uri="{FF2B5EF4-FFF2-40B4-BE49-F238E27FC236}">
-                  <a16:creationId xmlns:a16="http://schemas.microsoft.com/office/drawing/2014/main" id="{A5FE8239-9142-BCCD-EE17-399641E1A11B}"/>
-                </a:ext>
-              </a:extLst>
-            </p:cNvPr>
-            <p:cNvSpPr txBox="1"/>
-            <p:nvPr/>
-          </p:nvSpPr>
-          <p:spPr>
-            <a:xfrm>
-              <a:off x="3273075" y="26168980"/>
-              <a:ext cx="2225289" cy="584775"/>
-            </a:xfrm>
-            <a:prstGeom prst="rect">
-              <a:avLst/>
-            </a:prstGeom>
-            <a:noFill/>
-          </p:spPr>
-          <p:txBody>
-            <a:bodyPr wrap="none" rtlCol="0">
-              <a:spAutoFit/>
-            </a:bodyPr>
-            <a:lstStyle/>
-            <a:p>
-              <a:r>
-                <a:rPr lang="en-US" sz="3200" dirty="0">
-                  <a:latin typeface="+mj-lt"/>
-                  <a:cs typeface="Arial" panose="020B0604020202020204" pitchFamily="34" charset="0"/>
-                </a:rPr>
-                <a:t>Untidy table</a:t>
-              </a:r>
-            </a:p>
-          </p:txBody>
-        </p:sp>
-        <p:sp>
-          <p:nvSpPr>
-            <p:cNvPr id="34" name="TextBox 33">
-              <a:extLst>
-                <a:ext uri="{FF2B5EF4-FFF2-40B4-BE49-F238E27FC236}">
-                  <a16:creationId xmlns:a16="http://schemas.microsoft.com/office/drawing/2014/main" id="{4912DEF5-69EF-D5EA-890A-5C6F22926E40}"/>
-                </a:ext>
-              </a:extLst>
-            </p:cNvPr>
-            <p:cNvSpPr txBox="1"/>
-            <p:nvPr/>
-          </p:nvSpPr>
-          <p:spPr>
-            <a:xfrm>
-              <a:off x="8658764" y="27388180"/>
-              <a:ext cx="1893467" cy="5262979"/>
-            </a:xfrm>
-            <a:prstGeom prst="rect">
-              <a:avLst/>
-            </a:prstGeom>
-            <a:noFill/>
-          </p:spPr>
-          <p:txBody>
-            <a:bodyPr wrap="none" rtlCol="0">
-              <a:spAutoFit/>
-            </a:bodyPr>
-            <a:lstStyle/>
-            <a:p>
-              <a:r>
-                <a:rPr lang="en-US" sz="3200" dirty="0">
-                  <a:latin typeface="+mj-lt"/>
-                  <a:cs typeface="Arial" panose="020B0604020202020204" pitchFamily="34" charset="0"/>
-                </a:rPr>
-                <a:t>Better for </a:t>
-              </a:r>
-            </a:p>
-            <a:p>
-              <a:r>
-                <a:rPr lang="en-US" sz="3200" dirty="0">
-                  <a:latin typeface="+mj-lt"/>
-                  <a:cs typeface="Arial" panose="020B0604020202020204" pitchFamily="34" charset="0"/>
-                </a:rPr>
-                <a:t>reporting  </a:t>
-              </a:r>
-            </a:p>
-            <a:p>
-              <a:endParaRPr lang="en-US" sz="2600" dirty="0">
+                <a:latin typeface="Times" pitchFamily="-108" charset="0"/>
+                <a:ea typeface="ヒラギノ明朝 ProN W3" pitchFamily="-108" charset="-128"/>
+                <a:cs typeface="ヒラギノ明朝 ProN W3" pitchFamily="-108" charset="-128"/>
+                <a:sym typeface="Times" pitchFamily="-108" charset="0"/>
+              </a:defRPr>
+            </a:lvl1pPr>
+            <a:lvl2pPr marL="425224" indent="1482" algn="l" rtl="0" fontAlgn="base">
+              <a:spcBef>
+                <a:spcPct val="0"/>
+              </a:spcBef>
+              <a:spcAft>
+                <a:spcPct val="0"/>
+              </a:spcAft>
+              <a:defRPr sz="2400" kern="1200">
+                <a:solidFill>
+                  <a:srgbClr val="000000"/>
+                </a:solidFill>
+                <a:latin typeface="Times" pitchFamily="-108" charset="0"/>
+                <a:ea typeface="ヒラギノ明朝 ProN W3" pitchFamily="-108" charset="-128"/>
+                <a:cs typeface="ヒラギノ明朝 ProN W3" pitchFamily="-108" charset="-128"/>
+                <a:sym typeface="Times" pitchFamily="-108" charset="0"/>
+              </a:defRPr>
+            </a:lvl2pPr>
+            <a:lvl3pPr marL="851928" indent="1482" algn="l" rtl="0" fontAlgn="base">
+              <a:spcBef>
+                <a:spcPct val="0"/>
+              </a:spcBef>
+              <a:spcAft>
+                <a:spcPct val="0"/>
+              </a:spcAft>
+              <a:defRPr sz="2400" kern="1200">
+                <a:solidFill>
+                  <a:srgbClr val="000000"/>
+                </a:solidFill>
+                <a:latin typeface="Times" pitchFamily="-108" charset="0"/>
+                <a:ea typeface="ヒラギノ明朝 ProN W3" pitchFamily="-108" charset="-128"/>
+                <a:cs typeface="ヒラギノ明朝 ProN W3" pitchFamily="-108" charset="-128"/>
+                <a:sym typeface="Times" pitchFamily="-108" charset="0"/>
+              </a:defRPr>
+            </a:lvl3pPr>
+            <a:lvl4pPr marL="1278633" indent="1482" algn="l" rtl="0" fontAlgn="base">
+              <a:spcBef>
+                <a:spcPct val="0"/>
+              </a:spcBef>
+              <a:spcAft>
+                <a:spcPct val="0"/>
+              </a:spcAft>
+              <a:defRPr sz="2400" kern="1200">
+                <a:solidFill>
+                  <a:srgbClr val="000000"/>
+                </a:solidFill>
+                <a:latin typeface="Times" pitchFamily="-108" charset="0"/>
+                <a:ea typeface="ヒラギノ明朝 ProN W3" pitchFamily="-108" charset="-128"/>
+                <a:cs typeface="ヒラギノ明朝 ProN W3" pitchFamily="-108" charset="-128"/>
+                <a:sym typeface="Times" pitchFamily="-108" charset="0"/>
+              </a:defRPr>
+            </a:lvl4pPr>
+            <a:lvl5pPr marL="1705338" indent="1482" algn="l" rtl="0" fontAlgn="base">
+              <a:spcBef>
+                <a:spcPct val="0"/>
+              </a:spcBef>
+              <a:spcAft>
+                <a:spcPct val="0"/>
+              </a:spcAft>
+              <a:defRPr sz="2400" kern="1200">
+                <a:solidFill>
+                  <a:srgbClr val="000000"/>
+                </a:solidFill>
+                <a:latin typeface="Times" pitchFamily="-108" charset="0"/>
+                <a:ea typeface="ヒラギノ明朝 ProN W3" pitchFamily="-108" charset="-128"/>
+                <a:cs typeface="ヒラギノ明朝 ProN W3" pitchFamily="-108" charset="-128"/>
+                <a:sym typeface="Times" pitchFamily="-108" charset="0"/>
+              </a:defRPr>
+            </a:lvl5pPr>
+            <a:lvl6pPr marL="2133524" algn="l" defTabSz="426705" rtl="0" eaLnBrk="1" latinLnBrk="0" hangingPunct="1">
+              <a:defRPr sz="2400" kern="1200">
+                <a:solidFill>
+                  <a:srgbClr val="000000"/>
+                </a:solidFill>
+                <a:latin typeface="Times" pitchFamily="-108" charset="0"/>
+                <a:ea typeface="ヒラギノ明朝 ProN W3" pitchFamily="-108" charset="-128"/>
+                <a:cs typeface="ヒラギノ明朝 ProN W3" pitchFamily="-108" charset="-128"/>
+                <a:sym typeface="Times" pitchFamily="-108" charset="0"/>
+              </a:defRPr>
+            </a:lvl6pPr>
+            <a:lvl7pPr marL="2560229" algn="l" defTabSz="426705" rtl="0" eaLnBrk="1" latinLnBrk="0" hangingPunct="1">
+              <a:defRPr sz="2400" kern="1200">
+                <a:solidFill>
+                  <a:srgbClr val="000000"/>
+                </a:solidFill>
+                <a:latin typeface="Times" pitchFamily="-108" charset="0"/>
+                <a:ea typeface="ヒラギノ明朝 ProN W3" pitchFamily="-108" charset="-128"/>
+                <a:cs typeface="ヒラギノ明朝 ProN W3" pitchFamily="-108" charset="-128"/>
+                <a:sym typeface="Times" pitchFamily="-108" charset="0"/>
+              </a:defRPr>
+            </a:lvl7pPr>
+            <a:lvl8pPr marL="2986933" algn="l" defTabSz="426705" rtl="0" eaLnBrk="1" latinLnBrk="0" hangingPunct="1">
+              <a:defRPr sz="2400" kern="1200">
+                <a:solidFill>
+                  <a:srgbClr val="000000"/>
+                </a:solidFill>
+                <a:latin typeface="Times" pitchFamily="-108" charset="0"/>
+                <a:ea typeface="ヒラギノ明朝 ProN W3" pitchFamily="-108" charset="-128"/>
+                <a:cs typeface="ヒラギノ明朝 ProN W3" pitchFamily="-108" charset="-128"/>
+                <a:sym typeface="Times" pitchFamily="-108" charset="0"/>
+              </a:defRPr>
+            </a:lvl8pPr>
+            <a:lvl9pPr marL="3413638" algn="l" defTabSz="426705" rtl="0" eaLnBrk="1" latinLnBrk="0" hangingPunct="1">
+              <a:defRPr sz="2400" kern="1200">
+                <a:solidFill>
+                  <a:srgbClr val="000000"/>
+                </a:solidFill>
+                <a:latin typeface="Times" pitchFamily="-108" charset="0"/>
+                <a:ea typeface="ヒラギノ明朝 ProN W3" pitchFamily="-108" charset="-128"/>
+                <a:cs typeface="ヒラギノ明朝 ProN W3" pitchFamily="-108" charset="-128"/>
+                <a:sym typeface="Times" pitchFamily="-108" charset="0"/>
+              </a:defRPr>
+            </a:lvl9pPr>
+          </a:lstStyle>
+          <a:p>
+            <a:pPr algn="ctr">
+              <a:lnSpc>
+                <a:spcPct val="110000"/>
+              </a:lnSpc>
+              <a:tabLst>
+                <a:tab pos="201793" algn="l"/>
+                <a:tab pos="404492" algn="l"/>
+                <a:tab pos="607190" algn="l"/>
+                <a:tab pos="809888" algn="l"/>
+                <a:tab pos="1012587" algn="l"/>
+                <a:tab pos="1215286" algn="l"/>
+                <a:tab pos="1417983" algn="l"/>
+                <a:tab pos="1620682" algn="l"/>
+                <a:tab pos="1823380" algn="l"/>
+                <a:tab pos="2026078" algn="l"/>
+                <a:tab pos="2228776" algn="l"/>
+                <a:tab pos="2431475" algn="l"/>
+              </a:tabLst>
+            </a:pPr>
+            <a:r>
+              <a:rPr lang="en-US" sz="4400" b="1" dirty="0">
+                <a:solidFill>
+                  <a:schemeClr val="bg1"/>
+                </a:solidFill>
                 <a:latin typeface="+mj-lt"/>
-                <a:cs typeface="Arial" panose="020B0604020202020204" pitchFamily="34" charset="0"/>
-              </a:endParaRPr>
-            </a:p>
-            <a:p>
-              <a:endParaRPr lang="en-US" sz="2600" dirty="0">
+                <a:ea typeface="Verdana" pitchFamily="-108" charset="0"/>
+                <a:cs typeface="Verdana" pitchFamily="-108" charset="0"/>
+                <a:sym typeface="Verdana" pitchFamily="-108" charset="0"/>
+              </a:rPr>
+              <a:t>Results</a:t>
+            </a:r>
+            <a:r>
+              <a:rPr lang="en-US" sz="4000" b="1" dirty="0">
+                <a:solidFill>
+                  <a:schemeClr val="bg1"/>
+                </a:solidFill>
                 <a:latin typeface="+mj-lt"/>
-                <a:cs typeface="Arial" panose="020B0604020202020204" pitchFamily="34" charset="0"/>
-              </a:endParaRPr>
-            </a:p>
-            <a:p>
-              <a:endParaRPr lang="en-US" sz="2600" dirty="0">
-                <a:latin typeface="+mj-lt"/>
-                <a:cs typeface="Arial" panose="020B0604020202020204" pitchFamily="34" charset="0"/>
-              </a:endParaRPr>
-            </a:p>
-            <a:p>
-              <a:endParaRPr lang="en-US" sz="2600" dirty="0">
-                <a:latin typeface="+mj-lt"/>
-                <a:cs typeface="Arial" panose="020B0604020202020204" pitchFamily="34" charset="0"/>
-              </a:endParaRPr>
-            </a:p>
-            <a:p>
-              <a:endParaRPr lang="en-US" sz="2600" dirty="0">
-                <a:latin typeface="+mj-lt"/>
-                <a:cs typeface="Arial" panose="020B0604020202020204" pitchFamily="34" charset="0"/>
-              </a:endParaRPr>
-            </a:p>
-            <a:p>
-              <a:endParaRPr lang="en-US" sz="2600" dirty="0">
-                <a:latin typeface="+mj-lt"/>
-                <a:cs typeface="Arial" panose="020B0604020202020204" pitchFamily="34" charset="0"/>
-              </a:endParaRPr>
-            </a:p>
-            <a:p>
-              <a:endParaRPr lang="en-US" sz="2600" dirty="0">
-                <a:latin typeface="+mj-lt"/>
-                <a:cs typeface="Arial" panose="020B0604020202020204" pitchFamily="34" charset="0"/>
-              </a:endParaRPr>
-            </a:p>
-            <a:p>
-              <a:endParaRPr lang="en-US" sz="2600" dirty="0">
-                <a:latin typeface="+mj-lt"/>
-                <a:cs typeface="Arial" panose="020B0604020202020204" pitchFamily="34" charset="0"/>
-              </a:endParaRPr>
-            </a:p>
-            <a:p>
-              <a:r>
-                <a:rPr lang="en-US" sz="3200" dirty="0">
-                  <a:latin typeface="+mj-lt"/>
-                  <a:cs typeface="Arial" panose="020B0604020202020204" pitchFamily="34" charset="0"/>
-                </a:rPr>
-                <a:t>Better for </a:t>
-              </a:r>
-            </a:p>
-            <a:p>
-              <a:r>
-                <a:rPr lang="en-US" sz="3200" dirty="0">
-                  <a:latin typeface="+mj-lt"/>
-                  <a:cs typeface="Arial" panose="020B0604020202020204" pitchFamily="34" charset="0"/>
-                </a:rPr>
-                <a:t>analysis</a:t>
-              </a:r>
-            </a:p>
-          </p:txBody>
-        </p:sp>
-        <p:sp>
-          <p:nvSpPr>
-            <p:cNvPr id="38" name="TextBox 37">
-              <a:extLst>
-                <a:ext uri="{FF2B5EF4-FFF2-40B4-BE49-F238E27FC236}">
-                  <a16:creationId xmlns:a16="http://schemas.microsoft.com/office/drawing/2014/main" id="{7BB00E73-37E6-A3C3-B46A-F46CC4DAF4EE}"/>
-                </a:ext>
-              </a:extLst>
-            </p:cNvPr>
-            <p:cNvSpPr txBox="1"/>
-            <p:nvPr/>
-          </p:nvSpPr>
-          <p:spPr>
-            <a:xfrm>
-              <a:off x="3460996" y="29394205"/>
-              <a:ext cx="1845377" cy="584775"/>
-            </a:xfrm>
-            <a:prstGeom prst="rect">
-              <a:avLst/>
-            </a:prstGeom>
-            <a:noFill/>
-          </p:spPr>
-          <p:txBody>
-            <a:bodyPr wrap="none" rtlCol="0">
-              <a:spAutoFit/>
-            </a:bodyPr>
-            <a:lstStyle/>
-            <a:p>
-              <a:r>
-                <a:rPr lang="en-US" sz="3200" dirty="0">
-                  <a:latin typeface="+mj-lt"/>
-                  <a:cs typeface="Arial" panose="020B0604020202020204" pitchFamily="34" charset="0"/>
-                </a:rPr>
-                <a:t>Tidy table</a:t>
-              </a:r>
-            </a:p>
-          </p:txBody>
-        </p:sp>
-      </p:grpSp>
-      <p:grpSp>
-        <p:nvGrpSpPr>
-          <p:cNvPr id="66" name="Group 65">
+                <a:ea typeface="Verdana" pitchFamily="-108" charset="0"/>
+                <a:cs typeface="Verdana" pitchFamily="-108" charset="0"/>
+                <a:sym typeface="Verdana" pitchFamily="-108" charset="0"/>
+              </a:rPr>
+              <a:t> </a:t>
+            </a:r>
+          </a:p>
+        </p:txBody>
+      </p:sp>
+      <p:sp>
+        <p:nvSpPr>
+          <p:cNvPr id="79" name="Rectangle 78">
             <a:extLst>
               <a:ext uri="{FF2B5EF4-FFF2-40B4-BE49-F238E27FC236}">
-                <a16:creationId xmlns:a16="http://schemas.microsoft.com/office/drawing/2014/main" id="{CDEEE41F-2964-F3DC-8120-B588DEAB64DE}"/>
+                <a16:creationId xmlns:a16="http://schemas.microsoft.com/office/drawing/2014/main" id="{408171E9-3326-0DAC-0131-F130E9A2EC0C}"/>
               </a:ext>
             </a:extLst>
           </p:cNvPr>
-          <p:cNvGrpSpPr/>
+          <p:cNvSpPr>
+            <a:spLocks/>
+          </p:cNvSpPr>
           <p:nvPr/>
-        </p:nvGrpSpPr>
-        <p:grpSpPr>
+        </p:nvSpPr>
+        <p:spPr bwMode="auto">
           <a:xfrm>
-            <a:off x="20626727" y="25565000"/>
-            <a:ext cx="10076148" cy="10513661"/>
-            <a:chOff x="476083" y="23646343"/>
-            <a:chExt cx="10076148" cy="10513661"/>
+            <a:off x="20795053" y="25565000"/>
+            <a:ext cx="9601200" cy="777240"/>
           </a:xfrm>
-        </p:grpSpPr>
-        <p:grpSp>
-          <p:nvGrpSpPr>
-            <p:cNvPr id="67" name="Group 66">
-              <a:extLst>
-                <a:ext uri="{FF2B5EF4-FFF2-40B4-BE49-F238E27FC236}">
-                  <a16:creationId xmlns:a16="http://schemas.microsoft.com/office/drawing/2014/main" id="{FCE6FEBD-4EC1-D2A0-3EB0-D178C4B0D6D2}"/>
-                </a:ext>
-              </a:extLst>
-            </p:cNvPr>
-            <p:cNvGrpSpPr/>
-            <p:nvPr/>
-          </p:nvGrpSpPr>
-          <p:grpSpPr>
-            <a:xfrm>
-              <a:off x="644409" y="23646343"/>
-              <a:ext cx="9601200" cy="2431328"/>
-              <a:chOff x="576544" y="12808368"/>
-              <a:chExt cx="12222089" cy="3981163"/>
-            </a:xfrm>
-          </p:grpSpPr>
-          <p:sp>
-            <p:nvSpPr>
-              <p:cNvPr id="75" name="Rectangle 74">
-                <a:extLst>
-                  <a:ext uri="{FF2B5EF4-FFF2-40B4-BE49-F238E27FC236}">
-                    <a16:creationId xmlns:a16="http://schemas.microsoft.com/office/drawing/2014/main" id="{BF082CDF-7938-7957-008E-CBDF48D824B6}"/>
-                  </a:ext>
-                </a:extLst>
-              </p:cNvPr>
-              <p:cNvSpPr/>
-              <p:nvPr/>
-            </p:nvSpPr>
-            <p:spPr>
-              <a:xfrm>
-                <a:off x="576544" y="14219301"/>
-                <a:ext cx="12222089" cy="2570230"/>
-              </a:xfrm>
-              <a:prstGeom prst="rect">
-                <a:avLst/>
-              </a:prstGeom>
-            </p:spPr>
-            <p:txBody>
-              <a:bodyPr wrap="square">
-                <a:spAutoFit/>
-              </a:bodyPr>
-              <a:lstStyle/>
-              <a:p>
-                <a:pPr marL="457200" indent="-457200" algn="just">
-                  <a:spcBef>
-                    <a:spcPts val="0"/>
-                  </a:spcBef>
-                  <a:spcAft>
-                    <a:spcPts val="0"/>
-                  </a:spcAft>
-                  <a:buAutoNum type="arabicPeriod"/>
-                </a:pPr>
-                <a:r>
-                  <a:rPr lang="en-US" sz="3200" b="1" dirty="0">
-                    <a:solidFill>
-                      <a:srgbClr val="FF0000"/>
-                    </a:solidFill>
-                    <a:latin typeface="+mj-lt"/>
-                    <a:cs typeface="Arial" panose="020B0604020202020204" pitchFamily="34" charset="0"/>
-                  </a:rPr>
-                  <a:t>Each variable forms a column</a:t>
-                </a:r>
-              </a:p>
-              <a:p>
-                <a:pPr marL="457200" indent="-457200" algn="just">
-                  <a:spcBef>
-                    <a:spcPts val="0"/>
-                  </a:spcBef>
-                  <a:spcAft>
-                    <a:spcPts val="0"/>
-                  </a:spcAft>
-                  <a:buAutoNum type="arabicPeriod"/>
-                </a:pPr>
-                <a:r>
-                  <a:rPr lang="en-US" sz="3200" b="1" dirty="0">
-                    <a:solidFill>
-                      <a:srgbClr val="FF0000"/>
-                    </a:solidFill>
-                    <a:latin typeface="+mj-lt"/>
-                    <a:cs typeface="Arial" panose="020B0604020202020204" pitchFamily="34" charset="0"/>
-                  </a:rPr>
-                  <a:t>Each observation forms a row</a:t>
-                </a:r>
-              </a:p>
-              <a:p>
-                <a:pPr marL="457200" indent="-457200" algn="just">
-                  <a:spcBef>
-                    <a:spcPts val="0"/>
-                  </a:spcBef>
-                  <a:spcAft>
-                    <a:spcPts val="0"/>
-                  </a:spcAft>
-                  <a:buAutoNum type="arabicPeriod"/>
-                </a:pPr>
-                <a:r>
-                  <a:rPr lang="en-US" sz="3200" b="1" dirty="0">
-                    <a:solidFill>
-                      <a:srgbClr val="FF0000"/>
-                    </a:solidFill>
-                    <a:latin typeface="+mj-lt"/>
-                    <a:cs typeface="Arial" panose="020B0604020202020204" pitchFamily="34" charset="0"/>
-                  </a:rPr>
-                  <a:t>Each type of observational unit forms a table</a:t>
-                </a:r>
-              </a:p>
-            </p:txBody>
-          </p:sp>
-          <p:sp>
-            <p:nvSpPr>
-              <p:cNvPr id="79" name="Rectangle 78">
-                <a:extLst>
-                  <a:ext uri="{FF2B5EF4-FFF2-40B4-BE49-F238E27FC236}">
-                    <a16:creationId xmlns:a16="http://schemas.microsoft.com/office/drawing/2014/main" id="{408171E9-3326-0DAC-0131-F130E9A2EC0C}"/>
-                  </a:ext>
-                </a:extLst>
-              </p:cNvPr>
-              <p:cNvSpPr>
-                <a:spLocks/>
-              </p:cNvSpPr>
-              <p:nvPr/>
-            </p:nvSpPr>
-            <p:spPr bwMode="auto">
-              <a:xfrm>
-                <a:off x="576544" y="12808368"/>
-                <a:ext cx="12222089" cy="1272687"/>
-              </a:xfrm>
-              <a:prstGeom prst="rect">
-                <a:avLst/>
-              </a:prstGeom>
-              <a:solidFill>
-                <a:srgbClr val="009999"/>
-              </a:solidFill>
-              <a:ln w="12700">
+          <a:prstGeom prst="rect">
+            <a:avLst/>
+          </a:prstGeom>
+          <a:solidFill>
+            <a:srgbClr val="009999"/>
+          </a:solidFill>
+          <a:ln w="12700">
+            <a:solidFill>
+              <a:srgbClr val="009999"/>
+            </a:solidFill>
+            <a:miter lim="800000"/>
+            <a:headEnd/>
+            <a:tailEnd/>
+          </a:ln>
+        </p:spPr>
+        <p:txBody>
+          <a:bodyPr lIns="0" tIns="0" rIns="0" bIns="0" anchor="ctr">
+            <a:prstTxWarp prst="textNoShape">
+              <a:avLst/>
+            </a:prstTxWarp>
+          </a:bodyPr>
+          <a:lstStyle>
+            <a:defPPr>
+              <a:defRPr lang="en-US"/>
+            </a:defPPr>
+            <a:lvl1pPr algn="l" rtl="0" fontAlgn="base">
+              <a:spcBef>
+                <a:spcPct val="0"/>
+              </a:spcBef>
+              <a:spcAft>
+                <a:spcPct val="0"/>
+              </a:spcAft>
+              <a:defRPr sz="2400" kern="1200">
                 <a:solidFill>
-                  <a:srgbClr val="009999"/>
+                  <a:srgbClr val="000000"/>
                 </a:solidFill>
-                <a:miter lim="800000"/>
-                <a:headEnd/>
-                <a:tailEnd/>
-              </a:ln>
-            </p:spPr>
-            <p:txBody>
-              <a:bodyPr lIns="0" tIns="0" rIns="0" bIns="0" anchor="ctr">
-                <a:prstTxWarp prst="textNoShape">
-                  <a:avLst/>
-                </a:prstTxWarp>
-              </a:bodyPr>
-              <a:lstStyle>
-                <a:defPPr>
-                  <a:defRPr lang="en-US"/>
-                </a:defPPr>
-                <a:lvl1pPr algn="l" rtl="0" fontAlgn="base">
-                  <a:spcBef>
-                    <a:spcPct val="0"/>
-                  </a:spcBef>
-                  <a:spcAft>
-                    <a:spcPct val="0"/>
-                  </a:spcAft>
-                  <a:defRPr sz="2400" kern="1200">
-                    <a:solidFill>
-                      <a:srgbClr val="000000"/>
-                    </a:solidFill>
-                    <a:latin typeface="Times" pitchFamily="-108" charset="0"/>
-                    <a:ea typeface="ヒラギノ明朝 ProN W3" pitchFamily="-108" charset="-128"/>
-                    <a:cs typeface="ヒラギノ明朝 ProN W3" pitchFamily="-108" charset="-128"/>
-                    <a:sym typeface="Times" pitchFamily="-108" charset="0"/>
-                  </a:defRPr>
-                </a:lvl1pPr>
-                <a:lvl2pPr marL="425224" indent="1482" algn="l" rtl="0" fontAlgn="base">
-                  <a:spcBef>
-                    <a:spcPct val="0"/>
-                  </a:spcBef>
-                  <a:spcAft>
-                    <a:spcPct val="0"/>
-                  </a:spcAft>
-                  <a:defRPr sz="2400" kern="1200">
-                    <a:solidFill>
-                      <a:srgbClr val="000000"/>
-                    </a:solidFill>
-                    <a:latin typeface="Times" pitchFamily="-108" charset="0"/>
-                    <a:ea typeface="ヒラギノ明朝 ProN W3" pitchFamily="-108" charset="-128"/>
-                    <a:cs typeface="ヒラギノ明朝 ProN W3" pitchFamily="-108" charset="-128"/>
-                    <a:sym typeface="Times" pitchFamily="-108" charset="0"/>
-                  </a:defRPr>
-                </a:lvl2pPr>
-                <a:lvl3pPr marL="851928" indent="1482" algn="l" rtl="0" fontAlgn="base">
-                  <a:spcBef>
-                    <a:spcPct val="0"/>
-                  </a:spcBef>
-                  <a:spcAft>
-                    <a:spcPct val="0"/>
-                  </a:spcAft>
-                  <a:defRPr sz="2400" kern="1200">
-                    <a:solidFill>
-                      <a:srgbClr val="000000"/>
-                    </a:solidFill>
-                    <a:latin typeface="Times" pitchFamily="-108" charset="0"/>
-                    <a:ea typeface="ヒラギノ明朝 ProN W3" pitchFamily="-108" charset="-128"/>
-                    <a:cs typeface="ヒラギノ明朝 ProN W3" pitchFamily="-108" charset="-128"/>
-                    <a:sym typeface="Times" pitchFamily="-108" charset="0"/>
-                  </a:defRPr>
-                </a:lvl3pPr>
-                <a:lvl4pPr marL="1278633" indent="1482" algn="l" rtl="0" fontAlgn="base">
-                  <a:spcBef>
-                    <a:spcPct val="0"/>
-                  </a:spcBef>
-                  <a:spcAft>
-                    <a:spcPct val="0"/>
-                  </a:spcAft>
-                  <a:defRPr sz="2400" kern="1200">
-                    <a:solidFill>
-                      <a:srgbClr val="000000"/>
-                    </a:solidFill>
-                    <a:latin typeface="Times" pitchFamily="-108" charset="0"/>
-                    <a:ea typeface="ヒラギノ明朝 ProN W3" pitchFamily="-108" charset="-128"/>
-                    <a:cs typeface="ヒラギノ明朝 ProN W3" pitchFamily="-108" charset="-128"/>
-                    <a:sym typeface="Times" pitchFamily="-108" charset="0"/>
-                  </a:defRPr>
-                </a:lvl4pPr>
-                <a:lvl5pPr marL="1705338" indent="1482" algn="l" rtl="0" fontAlgn="base">
-                  <a:spcBef>
-                    <a:spcPct val="0"/>
-                  </a:spcBef>
-                  <a:spcAft>
-                    <a:spcPct val="0"/>
-                  </a:spcAft>
-                  <a:defRPr sz="2400" kern="1200">
-                    <a:solidFill>
-                      <a:srgbClr val="000000"/>
-                    </a:solidFill>
-                    <a:latin typeface="Times" pitchFamily="-108" charset="0"/>
-                    <a:ea typeface="ヒラギノ明朝 ProN W3" pitchFamily="-108" charset="-128"/>
-                    <a:cs typeface="ヒラギノ明朝 ProN W3" pitchFamily="-108" charset="-128"/>
-                    <a:sym typeface="Times" pitchFamily="-108" charset="0"/>
-                  </a:defRPr>
-                </a:lvl5pPr>
-                <a:lvl6pPr marL="2133524" algn="l" defTabSz="426705" rtl="0" eaLnBrk="1" latinLnBrk="0" hangingPunct="1">
-                  <a:defRPr sz="2400" kern="1200">
-                    <a:solidFill>
-                      <a:srgbClr val="000000"/>
-                    </a:solidFill>
-                    <a:latin typeface="Times" pitchFamily="-108" charset="0"/>
-                    <a:ea typeface="ヒラギノ明朝 ProN W3" pitchFamily="-108" charset="-128"/>
-                    <a:cs typeface="ヒラギノ明朝 ProN W3" pitchFamily="-108" charset="-128"/>
-                    <a:sym typeface="Times" pitchFamily="-108" charset="0"/>
-                  </a:defRPr>
-                </a:lvl6pPr>
-                <a:lvl7pPr marL="2560229" algn="l" defTabSz="426705" rtl="0" eaLnBrk="1" latinLnBrk="0" hangingPunct="1">
-                  <a:defRPr sz="2400" kern="1200">
-                    <a:solidFill>
-                      <a:srgbClr val="000000"/>
-                    </a:solidFill>
-                    <a:latin typeface="Times" pitchFamily="-108" charset="0"/>
-                    <a:ea typeface="ヒラギノ明朝 ProN W3" pitchFamily="-108" charset="-128"/>
-                    <a:cs typeface="ヒラギノ明朝 ProN W3" pitchFamily="-108" charset="-128"/>
-                    <a:sym typeface="Times" pitchFamily="-108" charset="0"/>
-                  </a:defRPr>
-                </a:lvl7pPr>
-                <a:lvl8pPr marL="2986933" algn="l" defTabSz="426705" rtl="0" eaLnBrk="1" latinLnBrk="0" hangingPunct="1">
-                  <a:defRPr sz="2400" kern="1200">
-                    <a:solidFill>
-                      <a:srgbClr val="000000"/>
-                    </a:solidFill>
-                    <a:latin typeface="Times" pitchFamily="-108" charset="0"/>
-                    <a:ea typeface="ヒラギノ明朝 ProN W3" pitchFamily="-108" charset="-128"/>
-                    <a:cs typeface="ヒラギノ明朝 ProN W3" pitchFamily="-108" charset="-128"/>
-                    <a:sym typeface="Times" pitchFamily="-108" charset="0"/>
-                  </a:defRPr>
-                </a:lvl8pPr>
-                <a:lvl9pPr marL="3413638" algn="l" defTabSz="426705" rtl="0" eaLnBrk="1" latinLnBrk="0" hangingPunct="1">
-                  <a:defRPr sz="2400" kern="1200">
-                    <a:solidFill>
-                      <a:srgbClr val="000000"/>
-                    </a:solidFill>
-                    <a:latin typeface="Times" pitchFamily="-108" charset="0"/>
-                    <a:ea typeface="ヒラギノ明朝 ProN W3" pitchFamily="-108" charset="-128"/>
-                    <a:cs typeface="ヒラギノ明朝 ProN W3" pitchFamily="-108" charset="-128"/>
-                    <a:sym typeface="Times" pitchFamily="-108" charset="0"/>
-                  </a:defRPr>
-                </a:lvl9pPr>
-              </a:lstStyle>
-              <a:p>
-                <a:pPr algn="ctr">
-                  <a:lnSpc>
-                    <a:spcPct val="110000"/>
-                  </a:lnSpc>
-                  <a:tabLst>
-                    <a:tab pos="201793" algn="l"/>
-                    <a:tab pos="404492" algn="l"/>
-                    <a:tab pos="607190" algn="l"/>
-                    <a:tab pos="809888" algn="l"/>
-                    <a:tab pos="1012587" algn="l"/>
-                    <a:tab pos="1215286" algn="l"/>
-                    <a:tab pos="1417983" algn="l"/>
-                    <a:tab pos="1620682" algn="l"/>
-                    <a:tab pos="1823380" algn="l"/>
-                    <a:tab pos="2026078" algn="l"/>
-                    <a:tab pos="2228776" algn="l"/>
-                    <a:tab pos="2431475" algn="l"/>
-                  </a:tabLst>
-                </a:pPr>
-                <a:r>
-                  <a:rPr lang="en-US" sz="4400" b="1" dirty="0">
-                    <a:solidFill>
-                      <a:schemeClr val="bg1"/>
-                    </a:solidFill>
-                    <a:latin typeface="+mj-lt"/>
-                    <a:ea typeface="Verdana" pitchFamily="-108" charset="0"/>
-                    <a:cs typeface="Verdana" pitchFamily="-108" charset="0"/>
-                    <a:sym typeface="Verdana" pitchFamily="-108" charset="0"/>
-                  </a:rPr>
-                  <a:t>Conclusion</a:t>
-                </a:r>
-                <a:r>
-                  <a:rPr lang="en-US" sz="4000" b="1" dirty="0">
-                    <a:solidFill>
-                      <a:schemeClr val="tx1"/>
-                    </a:solidFill>
-                    <a:latin typeface="+mj-lt"/>
-                    <a:ea typeface="Verdana" pitchFamily="-108" charset="0"/>
-                    <a:cs typeface="Verdana" pitchFamily="-108" charset="0"/>
-                    <a:sym typeface="Verdana" pitchFamily="-108" charset="0"/>
-                  </a:rPr>
-                  <a:t> </a:t>
-                </a:r>
-              </a:p>
-            </p:txBody>
-          </p:sp>
-        </p:grpSp>
-        <p:pic>
-          <p:nvPicPr>
-            <p:cNvPr id="68" name="Picture 67">
-              <a:extLst>
-                <a:ext uri="{FF2B5EF4-FFF2-40B4-BE49-F238E27FC236}">
-                  <a16:creationId xmlns:a16="http://schemas.microsoft.com/office/drawing/2014/main" id="{64CC689D-B149-F400-8B26-54F3B12D6C80}"/>
-                </a:ext>
-              </a:extLst>
-            </p:cNvPr>
-            <p:cNvPicPr>
-              <a:picLocks noChangeAspect="1"/>
-            </p:cNvPicPr>
-            <p:nvPr/>
-          </p:nvPicPr>
-          <p:blipFill>
-            <a:blip r:embed="rId7"/>
-            <a:stretch>
-              <a:fillRect/>
-            </a:stretch>
-          </p:blipFill>
-          <p:spPr>
-            <a:xfrm>
-              <a:off x="476083" y="26523090"/>
-              <a:ext cx="8317661" cy="2857211"/>
-            </a:xfrm>
-            <a:prstGeom prst="rect">
-              <a:avLst/>
-            </a:prstGeom>
-          </p:spPr>
-        </p:pic>
-        <p:pic>
-          <p:nvPicPr>
-            <p:cNvPr id="69" name="Picture 68">
-              <a:extLst>
-                <a:ext uri="{FF2B5EF4-FFF2-40B4-BE49-F238E27FC236}">
-                  <a16:creationId xmlns:a16="http://schemas.microsoft.com/office/drawing/2014/main" id="{17338179-D7F9-C5A8-3A79-250FD9B019FF}"/>
-                </a:ext>
-              </a:extLst>
-            </p:cNvPr>
-            <p:cNvPicPr>
-              <a:picLocks noChangeAspect="1"/>
-            </p:cNvPicPr>
-            <p:nvPr/>
-          </p:nvPicPr>
-          <p:blipFill>
-            <a:blip r:embed="rId8"/>
-            <a:stretch>
-              <a:fillRect/>
-            </a:stretch>
-          </p:blipFill>
-          <p:spPr>
-            <a:xfrm>
-              <a:off x="1612895" y="29926263"/>
-              <a:ext cx="5644988" cy="4233741"/>
-            </a:xfrm>
-            <a:prstGeom prst="rect">
-              <a:avLst/>
-            </a:prstGeom>
-          </p:spPr>
-        </p:pic>
-        <p:sp>
-          <p:nvSpPr>
-            <p:cNvPr id="71" name="TextBox 70">
-              <a:extLst>
-                <a:ext uri="{FF2B5EF4-FFF2-40B4-BE49-F238E27FC236}">
-                  <a16:creationId xmlns:a16="http://schemas.microsoft.com/office/drawing/2014/main" id="{A17D06FF-DAB7-EB6E-1CC9-2CE2E4690309}"/>
-                </a:ext>
-              </a:extLst>
-            </p:cNvPr>
-            <p:cNvSpPr txBox="1"/>
-            <p:nvPr/>
-          </p:nvSpPr>
-          <p:spPr>
-            <a:xfrm>
-              <a:off x="3273075" y="26168980"/>
-              <a:ext cx="2225289" cy="584775"/>
-            </a:xfrm>
-            <a:prstGeom prst="rect">
-              <a:avLst/>
-            </a:prstGeom>
-            <a:noFill/>
-          </p:spPr>
-          <p:txBody>
-            <a:bodyPr wrap="none" rtlCol="0">
-              <a:spAutoFit/>
-            </a:bodyPr>
-            <a:lstStyle/>
-            <a:p>
-              <a:r>
-                <a:rPr lang="en-US" sz="3200" dirty="0">
-                  <a:latin typeface="+mj-lt"/>
-                  <a:cs typeface="Arial" panose="020B0604020202020204" pitchFamily="34" charset="0"/>
-                </a:rPr>
-                <a:t>Untidy table</a:t>
-              </a:r>
-            </a:p>
-          </p:txBody>
-        </p:sp>
-        <p:sp>
-          <p:nvSpPr>
-            <p:cNvPr id="72" name="TextBox 71">
-              <a:extLst>
-                <a:ext uri="{FF2B5EF4-FFF2-40B4-BE49-F238E27FC236}">
-                  <a16:creationId xmlns:a16="http://schemas.microsoft.com/office/drawing/2014/main" id="{4F9E2C89-5CA7-2AC4-7B0B-DAE0601C72E7}"/>
-                </a:ext>
-              </a:extLst>
-            </p:cNvPr>
-            <p:cNvSpPr txBox="1"/>
-            <p:nvPr/>
-          </p:nvSpPr>
-          <p:spPr>
-            <a:xfrm>
-              <a:off x="8658764" y="27388180"/>
-              <a:ext cx="1893467" cy="5262979"/>
-            </a:xfrm>
-            <a:prstGeom prst="rect">
-              <a:avLst/>
-            </a:prstGeom>
-            <a:noFill/>
-          </p:spPr>
-          <p:txBody>
-            <a:bodyPr wrap="none" rtlCol="0">
-              <a:spAutoFit/>
-            </a:bodyPr>
-            <a:lstStyle/>
-            <a:p>
-              <a:r>
-                <a:rPr lang="en-US" sz="3200" dirty="0">
-                  <a:latin typeface="+mj-lt"/>
-                  <a:cs typeface="Arial" panose="020B0604020202020204" pitchFamily="34" charset="0"/>
-                </a:rPr>
-                <a:t>Better for </a:t>
-              </a:r>
-            </a:p>
-            <a:p>
-              <a:r>
-                <a:rPr lang="en-US" sz="3200" dirty="0">
-                  <a:latin typeface="+mj-lt"/>
-                  <a:cs typeface="Arial" panose="020B0604020202020204" pitchFamily="34" charset="0"/>
-                </a:rPr>
-                <a:t>reporting  </a:t>
-              </a:r>
-            </a:p>
-            <a:p>
-              <a:endParaRPr lang="en-US" sz="2600" dirty="0">
+                <a:latin typeface="Times" pitchFamily="-108" charset="0"/>
+                <a:ea typeface="ヒラギノ明朝 ProN W3" pitchFamily="-108" charset="-128"/>
+                <a:cs typeface="ヒラギノ明朝 ProN W3" pitchFamily="-108" charset="-128"/>
+                <a:sym typeface="Times" pitchFamily="-108" charset="0"/>
+              </a:defRPr>
+            </a:lvl1pPr>
+            <a:lvl2pPr marL="425224" indent="1482" algn="l" rtl="0" fontAlgn="base">
+              <a:spcBef>
+                <a:spcPct val="0"/>
+              </a:spcBef>
+              <a:spcAft>
+                <a:spcPct val="0"/>
+              </a:spcAft>
+              <a:defRPr sz="2400" kern="1200">
+                <a:solidFill>
+                  <a:srgbClr val="000000"/>
+                </a:solidFill>
+                <a:latin typeface="Times" pitchFamily="-108" charset="0"/>
+                <a:ea typeface="ヒラギノ明朝 ProN W3" pitchFamily="-108" charset="-128"/>
+                <a:cs typeface="ヒラギノ明朝 ProN W3" pitchFamily="-108" charset="-128"/>
+                <a:sym typeface="Times" pitchFamily="-108" charset="0"/>
+              </a:defRPr>
+            </a:lvl2pPr>
+            <a:lvl3pPr marL="851928" indent="1482" algn="l" rtl="0" fontAlgn="base">
+              <a:spcBef>
+                <a:spcPct val="0"/>
+              </a:spcBef>
+              <a:spcAft>
+                <a:spcPct val="0"/>
+              </a:spcAft>
+              <a:defRPr sz="2400" kern="1200">
+                <a:solidFill>
+                  <a:srgbClr val="000000"/>
+                </a:solidFill>
+                <a:latin typeface="Times" pitchFamily="-108" charset="0"/>
+                <a:ea typeface="ヒラギノ明朝 ProN W3" pitchFamily="-108" charset="-128"/>
+                <a:cs typeface="ヒラギノ明朝 ProN W3" pitchFamily="-108" charset="-128"/>
+                <a:sym typeface="Times" pitchFamily="-108" charset="0"/>
+              </a:defRPr>
+            </a:lvl3pPr>
+            <a:lvl4pPr marL="1278633" indent="1482" algn="l" rtl="0" fontAlgn="base">
+              <a:spcBef>
+                <a:spcPct val="0"/>
+              </a:spcBef>
+              <a:spcAft>
+                <a:spcPct val="0"/>
+              </a:spcAft>
+              <a:defRPr sz="2400" kern="1200">
+                <a:solidFill>
+                  <a:srgbClr val="000000"/>
+                </a:solidFill>
+                <a:latin typeface="Times" pitchFamily="-108" charset="0"/>
+                <a:ea typeface="ヒラギノ明朝 ProN W3" pitchFamily="-108" charset="-128"/>
+                <a:cs typeface="ヒラギノ明朝 ProN W3" pitchFamily="-108" charset="-128"/>
+                <a:sym typeface="Times" pitchFamily="-108" charset="0"/>
+              </a:defRPr>
+            </a:lvl4pPr>
+            <a:lvl5pPr marL="1705338" indent="1482" algn="l" rtl="0" fontAlgn="base">
+              <a:spcBef>
+                <a:spcPct val="0"/>
+              </a:spcBef>
+              <a:spcAft>
+                <a:spcPct val="0"/>
+              </a:spcAft>
+              <a:defRPr sz="2400" kern="1200">
+                <a:solidFill>
+                  <a:srgbClr val="000000"/>
+                </a:solidFill>
+                <a:latin typeface="Times" pitchFamily="-108" charset="0"/>
+                <a:ea typeface="ヒラギノ明朝 ProN W3" pitchFamily="-108" charset="-128"/>
+                <a:cs typeface="ヒラギノ明朝 ProN W3" pitchFamily="-108" charset="-128"/>
+                <a:sym typeface="Times" pitchFamily="-108" charset="0"/>
+              </a:defRPr>
+            </a:lvl5pPr>
+            <a:lvl6pPr marL="2133524" algn="l" defTabSz="426705" rtl="0" eaLnBrk="1" latinLnBrk="0" hangingPunct="1">
+              <a:defRPr sz="2400" kern="1200">
+                <a:solidFill>
+                  <a:srgbClr val="000000"/>
+                </a:solidFill>
+                <a:latin typeface="Times" pitchFamily="-108" charset="0"/>
+                <a:ea typeface="ヒラギノ明朝 ProN W3" pitchFamily="-108" charset="-128"/>
+                <a:cs typeface="ヒラギノ明朝 ProN W3" pitchFamily="-108" charset="-128"/>
+                <a:sym typeface="Times" pitchFamily="-108" charset="0"/>
+              </a:defRPr>
+            </a:lvl6pPr>
+            <a:lvl7pPr marL="2560229" algn="l" defTabSz="426705" rtl="0" eaLnBrk="1" latinLnBrk="0" hangingPunct="1">
+              <a:defRPr sz="2400" kern="1200">
+                <a:solidFill>
+                  <a:srgbClr val="000000"/>
+                </a:solidFill>
+                <a:latin typeface="Times" pitchFamily="-108" charset="0"/>
+                <a:ea typeface="ヒラギノ明朝 ProN W3" pitchFamily="-108" charset="-128"/>
+                <a:cs typeface="ヒラギノ明朝 ProN W3" pitchFamily="-108" charset="-128"/>
+                <a:sym typeface="Times" pitchFamily="-108" charset="0"/>
+              </a:defRPr>
+            </a:lvl7pPr>
+            <a:lvl8pPr marL="2986933" algn="l" defTabSz="426705" rtl="0" eaLnBrk="1" latinLnBrk="0" hangingPunct="1">
+              <a:defRPr sz="2400" kern="1200">
+                <a:solidFill>
+                  <a:srgbClr val="000000"/>
+                </a:solidFill>
+                <a:latin typeface="Times" pitchFamily="-108" charset="0"/>
+                <a:ea typeface="ヒラギノ明朝 ProN W3" pitchFamily="-108" charset="-128"/>
+                <a:cs typeface="ヒラギノ明朝 ProN W3" pitchFamily="-108" charset="-128"/>
+                <a:sym typeface="Times" pitchFamily="-108" charset="0"/>
+              </a:defRPr>
+            </a:lvl8pPr>
+            <a:lvl9pPr marL="3413638" algn="l" defTabSz="426705" rtl="0" eaLnBrk="1" latinLnBrk="0" hangingPunct="1">
+              <a:defRPr sz="2400" kern="1200">
+                <a:solidFill>
+                  <a:srgbClr val="000000"/>
+                </a:solidFill>
+                <a:latin typeface="Times" pitchFamily="-108" charset="0"/>
+                <a:ea typeface="ヒラギノ明朝 ProN W3" pitchFamily="-108" charset="-128"/>
+                <a:cs typeface="ヒラギノ明朝 ProN W3" pitchFamily="-108" charset="-128"/>
+                <a:sym typeface="Times" pitchFamily="-108" charset="0"/>
+              </a:defRPr>
+            </a:lvl9pPr>
+          </a:lstStyle>
+          <a:p>
+            <a:pPr algn="ctr">
+              <a:lnSpc>
+                <a:spcPct val="110000"/>
+              </a:lnSpc>
+              <a:tabLst>
+                <a:tab pos="201793" algn="l"/>
+                <a:tab pos="404492" algn="l"/>
+                <a:tab pos="607190" algn="l"/>
+                <a:tab pos="809888" algn="l"/>
+                <a:tab pos="1012587" algn="l"/>
+                <a:tab pos="1215286" algn="l"/>
+                <a:tab pos="1417983" algn="l"/>
+                <a:tab pos="1620682" algn="l"/>
+                <a:tab pos="1823380" algn="l"/>
+                <a:tab pos="2026078" algn="l"/>
+                <a:tab pos="2228776" algn="l"/>
+                <a:tab pos="2431475" algn="l"/>
+              </a:tabLst>
+            </a:pPr>
+            <a:r>
+              <a:rPr lang="en-US" sz="4400" b="1" dirty="0">
+                <a:solidFill>
+                  <a:schemeClr val="bg1"/>
+                </a:solidFill>
                 <a:latin typeface="+mj-lt"/>
-                <a:cs typeface="Arial" panose="020B0604020202020204" pitchFamily="34" charset="0"/>
-              </a:endParaRPr>
-            </a:p>
-            <a:p>
-              <a:endParaRPr lang="en-US" sz="2600" dirty="0">
+                <a:ea typeface="Verdana" pitchFamily="-108" charset="0"/>
+                <a:cs typeface="Verdana" pitchFamily="-108" charset="0"/>
+                <a:sym typeface="Verdana" pitchFamily="-108" charset="0"/>
+              </a:rPr>
+              <a:t>Conclusion</a:t>
+            </a:r>
+            <a:r>
+              <a:rPr lang="en-US" sz="4000" b="1" dirty="0">
+                <a:solidFill>
+                  <a:schemeClr val="tx1"/>
+                </a:solidFill>
                 <a:latin typeface="+mj-lt"/>
-                <a:cs typeface="Arial" panose="020B0604020202020204" pitchFamily="34" charset="0"/>
-              </a:endParaRPr>
-            </a:p>
-            <a:p>
-              <a:endParaRPr lang="en-US" sz="2600" dirty="0">
-                <a:latin typeface="+mj-lt"/>
-                <a:cs typeface="Arial" panose="020B0604020202020204" pitchFamily="34" charset="0"/>
-              </a:endParaRPr>
-            </a:p>
-            <a:p>
-              <a:endParaRPr lang="en-US" sz="2600" dirty="0">
-                <a:latin typeface="+mj-lt"/>
-                <a:cs typeface="Arial" panose="020B0604020202020204" pitchFamily="34" charset="0"/>
-              </a:endParaRPr>
-            </a:p>
-            <a:p>
-              <a:endParaRPr lang="en-US" sz="2600" dirty="0">
-                <a:latin typeface="+mj-lt"/>
-                <a:cs typeface="Arial" panose="020B0604020202020204" pitchFamily="34" charset="0"/>
-              </a:endParaRPr>
-            </a:p>
-            <a:p>
-              <a:endParaRPr lang="en-US" sz="2600" dirty="0">
-                <a:latin typeface="+mj-lt"/>
-                <a:cs typeface="Arial" panose="020B0604020202020204" pitchFamily="34" charset="0"/>
-              </a:endParaRPr>
-            </a:p>
-            <a:p>
-              <a:endParaRPr lang="en-US" sz="2600" dirty="0">
-                <a:latin typeface="+mj-lt"/>
-                <a:cs typeface="Arial" panose="020B0604020202020204" pitchFamily="34" charset="0"/>
-              </a:endParaRPr>
-            </a:p>
-            <a:p>
-              <a:endParaRPr lang="en-US" sz="2600" dirty="0">
-                <a:latin typeface="+mj-lt"/>
-                <a:cs typeface="Arial" panose="020B0604020202020204" pitchFamily="34" charset="0"/>
-              </a:endParaRPr>
-            </a:p>
-            <a:p>
-              <a:r>
-                <a:rPr lang="en-US" sz="3200" dirty="0">
-                  <a:latin typeface="+mj-lt"/>
-                  <a:cs typeface="Arial" panose="020B0604020202020204" pitchFamily="34" charset="0"/>
-                </a:rPr>
-                <a:t>Better for </a:t>
-              </a:r>
-            </a:p>
-            <a:p>
-              <a:r>
-                <a:rPr lang="en-US" sz="3200" dirty="0">
-                  <a:latin typeface="+mj-lt"/>
-                  <a:cs typeface="Arial" panose="020B0604020202020204" pitchFamily="34" charset="0"/>
-                </a:rPr>
-                <a:t>analysis</a:t>
-              </a:r>
-            </a:p>
-          </p:txBody>
-        </p:sp>
-        <p:sp>
-          <p:nvSpPr>
-            <p:cNvPr id="73" name="TextBox 72">
-              <a:extLst>
-                <a:ext uri="{FF2B5EF4-FFF2-40B4-BE49-F238E27FC236}">
-                  <a16:creationId xmlns:a16="http://schemas.microsoft.com/office/drawing/2014/main" id="{04C5C53A-8B97-3E3A-196D-2BCB43D0C7EA}"/>
-                </a:ext>
-              </a:extLst>
-            </p:cNvPr>
-            <p:cNvSpPr txBox="1"/>
-            <p:nvPr/>
-          </p:nvSpPr>
-          <p:spPr>
-            <a:xfrm>
-              <a:off x="3460996" y="29394205"/>
-              <a:ext cx="1845377" cy="584775"/>
-            </a:xfrm>
-            <a:prstGeom prst="rect">
-              <a:avLst/>
-            </a:prstGeom>
-            <a:noFill/>
-          </p:spPr>
-          <p:txBody>
-            <a:bodyPr wrap="none" rtlCol="0">
-              <a:spAutoFit/>
-            </a:bodyPr>
-            <a:lstStyle/>
-            <a:p>
-              <a:r>
-                <a:rPr lang="en-US" sz="3200" dirty="0">
-                  <a:latin typeface="+mj-lt"/>
-                  <a:cs typeface="Arial" panose="020B0604020202020204" pitchFamily="34" charset="0"/>
-                </a:rPr>
-                <a:t>Tidy table</a:t>
-              </a:r>
-            </a:p>
-          </p:txBody>
-        </p:sp>
-      </p:grpSp>
+                <a:ea typeface="Verdana" pitchFamily="-108" charset="0"/>
+                <a:cs typeface="Verdana" pitchFamily="-108" charset="0"/>
+                <a:sym typeface="Verdana" pitchFamily="-108" charset="0"/>
+              </a:rPr>
+              <a:t> </a:t>
+            </a:r>
+          </a:p>
+        </p:txBody>
+      </p:sp>
       <p:grpSp>
         <p:nvGrpSpPr>
           <p:cNvPr id="98" name="Group 97">
@@ -10629,7 +9926,7 @@
                   <a:ea typeface="Verdana" pitchFamily="-108" charset="0"/>
                   <a:cs typeface="Verdana" pitchFamily="-108" charset="0"/>
                   <a:sym typeface="Verdana" pitchFamily="-108" charset="0"/>
-                  <a:hlinkClick r:id="rId9"/>
+                  <a:hlinkClick r:id="rId7"/>
                 </a:rPr>
                 <a:t>https://towardsdatascience.com/r-basics-everything-you-need-to-know-to-get-started-with-r-10c8e566d7b3</a:t>
               </a:r>
@@ -10686,7 +9983,7 @@
                   <a:ea typeface="Verdana" pitchFamily="-108" charset="0"/>
                   <a:cs typeface="Verdana" pitchFamily="-108" charset="0"/>
                   <a:sym typeface="Verdana" pitchFamily="-108" charset="0"/>
-                  <a:hlinkClick r:id="rId10"/>
+                  <a:hlinkClick r:id="rId8"/>
                 </a:rPr>
                 <a:t>https://cran.r-project.org/web/packages/scrapeR/scrapeR.pdf</a:t>
               </a:r>
@@ -10743,7 +10040,7 @@
                   <a:ea typeface="Verdana" pitchFamily="-108" charset="0"/>
                   <a:cs typeface="Verdana" pitchFamily="-108" charset="0"/>
                   <a:sym typeface="Verdana" pitchFamily="-108" charset="0"/>
-                  <a:hlinkClick r:id="rId11"/>
+                  <a:hlinkClick r:id="rId9"/>
                 </a:rPr>
                 <a:t>https://www.datacamp.com/community/tutorials/r-tutorial-read-excel-into-r</a:t>
               </a:r>
@@ -10800,7 +10097,7 @@
                   <a:ea typeface="Verdana" pitchFamily="-108" charset="0"/>
                   <a:cs typeface="Verdana" pitchFamily="-108" charset="0"/>
                   <a:sym typeface="Verdana" pitchFamily="-108" charset="0"/>
-                  <a:hlinkClick r:id="rId12"/>
+                  <a:hlinkClick r:id="rId10"/>
                 </a:rPr>
                 <a:t>https://www.statmethods.net/input/missingdata.html</a:t>
               </a:r>
@@ -10857,7 +10154,7 @@
                   <a:ea typeface="Verdana" pitchFamily="-108" charset="0"/>
                   <a:cs typeface="Verdana" pitchFamily="-108" charset="0"/>
                   <a:sym typeface="Verdana" pitchFamily="-108" charset="0"/>
-                  <a:hlinkClick r:id="rId13"/>
+                  <a:hlinkClick r:id="rId11"/>
                 </a:rPr>
                 <a:t>https://www.analyticsvidhya.com/blog/2015/07/guide-data-visualization-r/</a:t>
               </a:r>
@@ -11098,7 +10395,7 @@
           <p:nvPr/>
         </p:nvPicPr>
         <p:blipFill>
-          <a:blip r:embed="rId14"/>
+          <a:blip r:embed="rId12"/>
           <a:stretch>
             <a:fillRect/>
           </a:stretch>
@@ -11559,21 +10856,544 @@
           <p:nvPr>
             <p:extLst>
               <p:ext uri="{D42A27DB-BD31-4B8C-83A1-F6EECF244321}">
-                <p14:modId xmlns:p14="http://schemas.microsoft.com/office/powerpoint/2010/main" val="966926557"/>
+                <p14:modId xmlns:p14="http://schemas.microsoft.com/office/powerpoint/2010/main" val="607467781"/>
               </p:ext>
             </p:extLst>
           </p:nvPr>
         </p:nvGraphicFramePr>
         <p:xfrm>
-          <a:off x="11588020" y="6065837"/>
+          <a:off x="11512911" y="5622211"/>
           <a:ext cx="7973391" cy="9587626"/>
         </p:xfrm>
         <a:graphic>
           <a:graphicData uri="http://schemas.openxmlformats.org/drawingml/2006/diagram">
-            <dgm:relIds xmlns:dgm="http://schemas.openxmlformats.org/drawingml/2006/diagram" xmlns:r="http://schemas.openxmlformats.org/officeDocument/2006/relationships" r:dm="rId15" r:lo="rId16" r:qs="rId17" r:cs="rId18"/>
+            <dgm:relIds xmlns:dgm="http://schemas.openxmlformats.org/drawingml/2006/diagram" xmlns:r="http://schemas.openxmlformats.org/officeDocument/2006/relationships" r:dm="rId13" r:lo="rId14" r:qs="rId15" r:cs="rId16"/>
           </a:graphicData>
         </a:graphic>
       </p:graphicFrame>
+      <p:pic>
+        <p:nvPicPr>
+          <p:cNvPr id="5" name="Picture 4">
+            <a:extLst>
+              <a:ext uri="{FF2B5EF4-FFF2-40B4-BE49-F238E27FC236}">
+                <a16:creationId xmlns:a16="http://schemas.microsoft.com/office/drawing/2014/main" id="{D62DB3EE-BCA3-9139-C67F-9DEB4EDDA89D}"/>
+              </a:ext>
+            </a:extLst>
+          </p:cNvPr>
+          <p:cNvPicPr>
+            <a:picLocks noChangeAspect="1"/>
+          </p:cNvPicPr>
+          <p:nvPr/>
+        </p:nvPicPr>
+        <p:blipFill>
+          <a:blip r:embed="rId18"/>
+          <a:stretch>
+            <a:fillRect/>
+          </a:stretch>
+        </p:blipFill>
+        <p:spPr>
+          <a:xfrm>
+            <a:off x="21412571" y="11173637"/>
+            <a:ext cx="8013600" cy="3960000"/>
+          </a:xfrm>
+          <a:prstGeom prst="rect">
+            <a:avLst/>
+          </a:prstGeom>
+        </p:spPr>
+      </p:pic>
+      <p:pic>
+        <p:nvPicPr>
+          <p:cNvPr id="6" name="Picture 5">
+            <a:extLst>
+              <a:ext uri="{FF2B5EF4-FFF2-40B4-BE49-F238E27FC236}">
+                <a16:creationId xmlns:a16="http://schemas.microsoft.com/office/drawing/2014/main" id="{6597B95E-060D-7078-DA1A-2BD17F0CA328}"/>
+              </a:ext>
+            </a:extLst>
+          </p:cNvPr>
+          <p:cNvPicPr>
+            <a:picLocks noChangeAspect="1"/>
+          </p:cNvPicPr>
+          <p:nvPr/>
+        </p:nvPicPr>
+        <p:blipFill>
+          <a:blip r:embed="rId19"/>
+          <a:stretch>
+            <a:fillRect/>
+          </a:stretch>
+        </p:blipFill>
+        <p:spPr>
+          <a:xfrm>
+            <a:off x="21219190" y="16429037"/>
+            <a:ext cx="8640000" cy="4459499"/>
+          </a:xfrm>
+          <a:prstGeom prst="rect">
+            <a:avLst/>
+          </a:prstGeom>
+        </p:spPr>
+      </p:pic>
+      <p:sp>
+        <p:nvSpPr>
+          <p:cNvPr id="11" name="Rectangle 10">
+            <a:extLst>
+              <a:ext uri="{FF2B5EF4-FFF2-40B4-BE49-F238E27FC236}">
+                <a16:creationId xmlns:a16="http://schemas.microsoft.com/office/drawing/2014/main" id="{5757030B-2C66-F8D2-64A5-9F2455977DC2}"/>
+              </a:ext>
+            </a:extLst>
+          </p:cNvPr>
+          <p:cNvSpPr/>
+          <p:nvPr/>
+        </p:nvSpPr>
+        <p:spPr>
+          <a:xfrm>
+            <a:off x="20624534" y="4824313"/>
+            <a:ext cx="9601201" cy="2308324"/>
+          </a:xfrm>
+          <a:prstGeom prst="rect">
+            <a:avLst/>
+          </a:prstGeom>
+        </p:spPr>
+        <p:txBody>
+          <a:bodyPr wrap="square">
+            <a:spAutoFit/>
+          </a:bodyPr>
+          <a:lstStyle/>
+          <a:p>
+            <a:pPr marL="571500" indent="-571500" algn="just">
+              <a:spcBef>
+                <a:spcPts val="0"/>
+              </a:spcBef>
+              <a:spcAft>
+                <a:spcPts val="0"/>
+              </a:spcAft>
+              <a:buFont typeface="Wingdings" panose="05000000000000000000" pitchFamily="2" charset="2"/>
+              <a:buChar char="Ø"/>
+            </a:pPr>
+            <a:r>
+              <a:rPr lang="en-US" sz="3600" dirty="0">
+                <a:latin typeface="+mj-lt"/>
+                <a:cs typeface="Arial" panose="020B0604020202020204" pitchFamily="34" charset="0"/>
+              </a:rPr>
+              <a:t>Bar chart showing response times for different disposition codes. Red color refers to transportation time.</a:t>
+            </a:r>
+          </a:p>
+          <a:p>
+            <a:pPr marL="571500" indent="-571500" algn="just">
+              <a:spcBef>
+                <a:spcPts val="0"/>
+              </a:spcBef>
+              <a:spcAft>
+                <a:spcPts val="0"/>
+              </a:spcAft>
+              <a:buFont typeface="Wingdings" panose="05000000000000000000" pitchFamily="2" charset="2"/>
+              <a:buChar char="Ø"/>
+            </a:pPr>
+            <a:endParaRPr lang="en-US" sz="3600" dirty="0">
+              <a:latin typeface="+mj-lt"/>
+              <a:cs typeface="Arial" panose="020B0604020202020204" pitchFamily="34" charset="0"/>
+            </a:endParaRPr>
+          </a:p>
+        </p:txBody>
+      </p:sp>
+      <p:pic>
+        <p:nvPicPr>
+          <p:cNvPr id="17" name="Picture 16">
+            <a:extLst>
+              <a:ext uri="{FF2B5EF4-FFF2-40B4-BE49-F238E27FC236}">
+                <a16:creationId xmlns:a16="http://schemas.microsoft.com/office/drawing/2014/main" id="{31087B0C-42DF-9144-C1CF-099B42502BCE}"/>
+              </a:ext>
+            </a:extLst>
+          </p:cNvPr>
+          <p:cNvPicPr>
+            <a:picLocks noChangeAspect="1"/>
+          </p:cNvPicPr>
+          <p:nvPr/>
+        </p:nvPicPr>
+        <p:blipFill rotWithShape="1">
+          <a:blip r:embed="rId20"/>
+          <a:srcRect t="4240"/>
+          <a:stretch/>
+        </p:blipFill>
+        <p:spPr>
+          <a:xfrm>
+            <a:off x="21589669" y="6601637"/>
+            <a:ext cx="8011966" cy="3960000"/>
+          </a:xfrm>
+          <a:prstGeom prst="rect">
+            <a:avLst/>
+          </a:prstGeom>
+        </p:spPr>
+      </p:pic>
+      <p:sp>
+        <p:nvSpPr>
+          <p:cNvPr id="19" name="Rectangle 18">
+            <a:extLst>
+              <a:ext uri="{FF2B5EF4-FFF2-40B4-BE49-F238E27FC236}">
+                <a16:creationId xmlns:a16="http://schemas.microsoft.com/office/drawing/2014/main" id="{C398810E-2789-B866-2113-1F8DBFBD40FF}"/>
+              </a:ext>
+            </a:extLst>
+          </p:cNvPr>
+          <p:cNvSpPr/>
+          <p:nvPr/>
+        </p:nvSpPr>
+        <p:spPr>
+          <a:xfrm>
+            <a:off x="20795052" y="10504308"/>
+            <a:ext cx="9601201" cy="1200329"/>
+          </a:xfrm>
+          <a:prstGeom prst="rect">
+            <a:avLst/>
+          </a:prstGeom>
+        </p:spPr>
+        <p:txBody>
+          <a:bodyPr wrap="square">
+            <a:spAutoFit/>
+          </a:bodyPr>
+          <a:lstStyle/>
+          <a:p>
+            <a:pPr marL="571500" indent="-571500" algn="just">
+              <a:spcBef>
+                <a:spcPts val="0"/>
+              </a:spcBef>
+              <a:spcAft>
+                <a:spcPts val="0"/>
+              </a:spcAft>
+              <a:buFont typeface="Wingdings" panose="05000000000000000000" pitchFamily="2" charset="2"/>
+              <a:buChar char="Ø"/>
+            </a:pPr>
+            <a:r>
+              <a:rPr lang="en-US" sz="3600" dirty="0">
+                <a:latin typeface="+mj-lt"/>
+                <a:cs typeface="Arial" panose="020B0604020202020204" pitchFamily="34" charset="0"/>
+              </a:rPr>
+              <a:t>Plot showing changes in incident counts by year</a:t>
+            </a:r>
+          </a:p>
+          <a:p>
+            <a:pPr marL="571500" indent="-571500" algn="just">
+              <a:spcBef>
+                <a:spcPts val="0"/>
+              </a:spcBef>
+              <a:spcAft>
+                <a:spcPts val="0"/>
+              </a:spcAft>
+              <a:buFont typeface="Wingdings" panose="05000000000000000000" pitchFamily="2" charset="2"/>
+              <a:buChar char="Ø"/>
+            </a:pPr>
+            <a:endParaRPr lang="en-US" sz="3600" dirty="0">
+              <a:latin typeface="+mj-lt"/>
+              <a:cs typeface="Arial" panose="020B0604020202020204" pitchFamily="34" charset="0"/>
+            </a:endParaRPr>
+          </a:p>
+        </p:txBody>
+      </p:sp>
+      <p:sp>
+        <p:nvSpPr>
+          <p:cNvPr id="21" name="Rectangle 20">
+            <a:extLst>
+              <a:ext uri="{FF2B5EF4-FFF2-40B4-BE49-F238E27FC236}">
+                <a16:creationId xmlns:a16="http://schemas.microsoft.com/office/drawing/2014/main" id="{5FDA2300-9C96-5937-2EE2-9609AD796EC3}"/>
+              </a:ext>
+            </a:extLst>
+          </p:cNvPr>
+          <p:cNvSpPr/>
+          <p:nvPr/>
+        </p:nvSpPr>
+        <p:spPr>
+          <a:xfrm>
+            <a:off x="20795052" y="15127348"/>
+            <a:ext cx="9601201" cy="1200329"/>
+          </a:xfrm>
+          <a:prstGeom prst="rect">
+            <a:avLst/>
+          </a:prstGeom>
+        </p:spPr>
+        <p:txBody>
+          <a:bodyPr wrap="square">
+            <a:spAutoFit/>
+          </a:bodyPr>
+          <a:lstStyle/>
+          <a:p>
+            <a:pPr marL="571500" indent="-571500" algn="just">
+              <a:spcBef>
+                <a:spcPts val="0"/>
+              </a:spcBef>
+              <a:spcAft>
+                <a:spcPts val="0"/>
+              </a:spcAft>
+              <a:buFont typeface="Wingdings" panose="05000000000000000000" pitchFamily="2" charset="2"/>
+              <a:buChar char="Ø"/>
+            </a:pPr>
+            <a:r>
+              <a:rPr lang="en-US" sz="3600" dirty="0">
+                <a:latin typeface="+mj-lt"/>
+                <a:cs typeface="Arial" panose="020B0604020202020204" pitchFamily="34" charset="0"/>
+              </a:rPr>
+              <a:t>Chart describing incident counts by month for every year from 2008-2016</a:t>
+            </a:r>
+          </a:p>
+        </p:txBody>
+      </p:sp>
+      <p:sp>
+        <p:nvSpPr>
+          <p:cNvPr id="22" name="Rectangle 21">
+            <a:extLst>
+              <a:ext uri="{FF2B5EF4-FFF2-40B4-BE49-F238E27FC236}">
+                <a16:creationId xmlns:a16="http://schemas.microsoft.com/office/drawing/2014/main" id="{2FC97645-5F7A-8909-03F8-DC1EC4A82BA5}"/>
+              </a:ext>
+            </a:extLst>
+          </p:cNvPr>
+          <p:cNvSpPr/>
+          <p:nvPr/>
+        </p:nvSpPr>
+        <p:spPr>
+          <a:xfrm>
+            <a:off x="20738590" y="20896322"/>
+            <a:ext cx="9601201" cy="4524315"/>
+          </a:xfrm>
+          <a:prstGeom prst="rect">
+            <a:avLst/>
+          </a:prstGeom>
+        </p:spPr>
+        <p:txBody>
+          <a:bodyPr wrap="square">
+            <a:spAutoFit/>
+          </a:bodyPr>
+          <a:lstStyle/>
+          <a:p>
+            <a:pPr marL="571500" indent="-571500" algn="just">
+              <a:spcBef>
+                <a:spcPts val="0"/>
+              </a:spcBef>
+              <a:spcAft>
+                <a:spcPts val="0"/>
+              </a:spcAft>
+              <a:buFont typeface="Wingdings" panose="05000000000000000000" pitchFamily="2" charset="2"/>
+              <a:buChar char="Ø"/>
+            </a:pPr>
+            <a:r>
+              <a:rPr lang="en-US" sz="3600" dirty="0">
+                <a:latin typeface="+mj-lt"/>
+                <a:cs typeface="Arial" panose="020B0604020202020204" pitchFamily="34" charset="0"/>
+              </a:rPr>
+              <a:t>Following were performed for data cleaning:</a:t>
+            </a:r>
+          </a:p>
+          <a:p>
+            <a:pPr marL="975463" lvl="1" indent="-571500" algn="just">
+              <a:spcBef>
+                <a:spcPts val="0"/>
+              </a:spcBef>
+              <a:spcAft>
+                <a:spcPts val="0"/>
+              </a:spcAft>
+              <a:buFont typeface="Wingdings" panose="05000000000000000000" pitchFamily="2" charset="2"/>
+              <a:buChar char="v"/>
+            </a:pPr>
+            <a:r>
+              <a:rPr lang="en-US" sz="3600" dirty="0">
+                <a:latin typeface="+mj-lt"/>
+                <a:cs typeface="Arial" panose="020B0604020202020204" pitchFamily="34" charset="0"/>
+              </a:rPr>
+              <a:t>Removed XXX Outliers from the Weather and EMS dataset.</a:t>
+            </a:r>
+          </a:p>
+          <a:p>
+            <a:pPr marL="975463" lvl="1" indent="-571500" algn="just">
+              <a:spcBef>
+                <a:spcPts val="0"/>
+              </a:spcBef>
+              <a:spcAft>
+                <a:spcPts val="0"/>
+              </a:spcAft>
+              <a:buFont typeface="Wingdings" panose="05000000000000000000" pitchFamily="2" charset="2"/>
+              <a:buChar char="v"/>
+            </a:pPr>
+            <a:r>
+              <a:rPr lang="en-US" sz="3600" dirty="0">
+                <a:latin typeface="+mj-lt"/>
+                <a:cs typeface="Arial" panose="020B0604020202020204" pitchFamily="34" charset="0"/>
+              </a:rPr>
+              <a:t>Removed XXX N/A values from EMS dataset.</a:t>
+            </a:r>
+          </a:p>
+          <a:p>
+            <a:pPr marL="975463" lvl="1" indent="-571500" algn="just">
+              <a:spcBef>
+                <a:spcPts val="0"/>
+              </a:spcBef>
+              <a:spcAft>
+                <a:spcPts val="0"/>
+              </a:spcAft>
+              <a:buFont typeface="Wingdings" panose="05000000000000000000" pitchFamily="2" charset="2"/>
+              <a:buChar char="v"/>
+            </a:pPr>
+            <a:r>
+              <a:rPr lang="en-US" sz="3600" dirty="0">
+                <a:latin typeface="+mj-lt"/>
+                <a:cs typeface="Arial" panose="020B0604020202020204" pitchFamily="34" charset="0"/>
+              </a:rPr>
+              <a:t>Removed XXX columns from Weather dataset as they had majority of N/A values.</a:t>
+            </a:r>
+          </a:p>
+          <a:p>
+            <a:pPr marL="975463" lvl="1" indent="-571500" algn="just">
+              <a:spcBef>
+                <a:spcPts val="0"/>
+              </a:spcBef>
+              <a:spcAft>
+                <a:spcPts val="0"/>
+              </a:spcAft>
+              <a:buFont typeface="Wingdings" panose="05000000000000000000" pitchFamily="2" charset="2"/>
+              <a:buChar char="v"/>
+            </a:pPr>
+            <a:r>
+              <a:rPr lang="en-US" sz="3600" dirty="0">
+                <a:latin typeface="+mj-lt"/>
+                <a:cs typeface="Arial" panose="020B0604020202020204" pitchFamily="34" charset="0"/>
+              </a:rPr>
+              <a:t>Converted Data Formats, Strings to numbers.</a:t>
+            </a:r>
+          </a:p>
+        </p:txBody>
+      </p:sp>
+      <p:sp>
+        <p:nvSpPr>
+          <p:cNvPr id="3" name="Rectangle 2">
+            <a:extLst>
+              <a:ext uri="{FF2B5EF4-FFF2-40B4-BE49-F238E27FC236}">
+                <a16:creationId xmlns:a16="http://schemas.microsoft.com/office/drawing/2014/main" id="{7B1639AC-90FA-9CC8-E3B9-0C38EF7256DF}"/>
+              </a:ext>
+            </a:extLst>
+          </p:cNvPr>
+          <p:cNvSpPr/>
+          <p:nvPr/>
+        </p:nvSpPr>
+        <p:spPr>
+          <a:xfrm>
+            <a:off x="10738308" y="26446539"/>
+            <a:ext cx="9522596" cy="2862322"/>
+          </a:xfrm>
+          <a:prstGeom prst="rect">
+            <a:avLst/>
+          </a:prstGeom>
+        </p:spPr>
+        <p:txBody>
+          <a:bodyPr wrap="square">
+            <a:spAutoFit/>
+          </a:bodyPr>
+          <a:lstStyle/>
+          <a:p>
+            <a:pPr marL="571500" indent="-571500" algn="just">
+              <a:spcBef>
+                <a:spcPts val="0"/>
+              </a:spcBef>
+              <a:spcAft>
+                <a:spcPts val="0"/>
+              </a:spcAft>
+              <a:buFont typeface="Wingdings" panose="05000000000000000000" pitchFamily="2" charset="2"/>
+              <a:buChar char="Ø"/>
+            </a:pPr>
+            <a:r>
+              <a:rPr lang="en-US" sz="3600" dirty="0">
+                <a:solidFill>
+                  <a:schemeClr val="tx1"/>
+                </a:solidFill>
+                <a:latin typeface="+mj-lt"/>
+                <a:cs typeface="Arial" panose="020B0604020202020204" pitchFamily="34" charset="0"/>
+              </a:rPr>
+              <a:t>4 regression models were built for evaluation:</a:t>
+            </a:r>
+          </a:p>
+          <a:p>
+            <a:pPr marL="975463" lvl="1" indent="-571500" algn="just">
+              <a:spcBef>
+                <a:spcPts val="0"/>
+              </a:spcBef>
+              <a:spcAft>
+                <a:spcPts val="0"/>
+              </a:spcAft>
+              <a:buFont typeface="Wingdings" panose="05000000000000000000" pitchFamily="2" charset="2"/>
+              <a:buChar char="v"/>
+            </a:pPr>
+            <a:r>
+              <a:rPr lang="en-US" sz="3600" dirty="0">
+                <a:solidFill>
+                  <a:schemeClr val="tx1"/>
+                </a:solidFill>
+                <a:latin typeface="+mj-lt"/>
+                <a:cs typeface="Arial" panose="020B0604020202020204" pitchFamily="34" charset="0"/>
+              </a:rPr>
+              <a:t>Polynomial Regression</a:t>
+            </a:r>
+          </a:p>
+          <a:p>
+            <a:pPr marL="975463" lvl="1" indent="-571500" algn="just">
+              <a:spcBef>
+                <a:spcPts val="0"/>
+              </a:spcBef>
+              <a:spcAft>
+                <a:spcPts val="0"/>
+              </a:spcAft>
+              <a:buFont typeface="Wingdings" panose="05000000000000000000" pitchFamily="2" charset="2"/>
+              <a:buChar char="v"/>
+            </a:pPr>
+            <a:r>
+              <a:rPr lang="en-US" sz="3600" dirty="0">
+                <a:solidFill>
+                  <a:schemeClr val="tx1"/>
+                </a:solidFill>
+                <a:latin typeface="+mj-lt"/>
+                <a:cs typeface="Arial" panose="020B0604020202020204" pitchFamily="34" charset="0"/>
+              </a:rPr>
+              <a:t>Support Vector Machine</a:t>
+            </a:r>
+          </a:p>
+          <a:p>
+            <a:pPr marL="975463" lvl="1" indent="-571500" algn="just">
+              <a:spcBef>
+                <a:spcPts val="0"/>
+              </a:spcBef>
+              <a:spcAft>
+                <a:spcPts val="0"/>
+              </a:spcAft>
+              <a:buFont typeface="Wingdings" panose="05000000000000000000" pitchFamily="2" charset="2"/>
+              <a:buChar char="v"/>
+            </a:pPr>
+            <a:r>
+              <a:rPr lang="en-US" sz="3600" dirty="0">
+                <a:solidFill>
+                  <a:schemeClr val="tx1"/>
+                </a:solidFill>
+                <a:latin typeface="+mj-lt"/>
+                <a:cs typeface="Arial" panose="020B0604020202020204" pitchFamily="34" charset="0"/>
+              </a:rPr>
+              <a:t>Random Forest</a:t>
+            </a:r>
+          </a:p>
+          <a:p>
+            <a:pPr marL="975463" lvl="1" indent="-571500" algn="just">
+              <a:spcBef>
+                <a:spcPts val="0"/>
+              </a:spcBef>
+              <a:spcAft>
+                <a:spcPts val="0"/>
+              </a:spcAft>
+              <a:buFont typeface="Wingdings" panose="05000000000000000000" pitchFamily="2" charset="2"/>
+              <a:buChar char="v"/>
+            </a:pPr>
+            <a:r>
+              <a:rPr lang="en-US" sz="3600" dirty="0">
+                <a:solidFill>
+                  <a:schemeClr val="tx1"/>
+                </a:solidFill>
+                <a:latin typeface="+mj-lt"/>
+                <a:cs typeface="Arial" panose="020B0604020202020204" pitchFamily="34" charset="0"/>
+              </a:rPr>
+              <a:t>K-Nearest Neighbors</a:t>
+            </a:r>
+          </a:p>
+        </p:txBody>
+      </p:sp>
     </p:spTree>
   </p:cSld>
   <p:clrMapOvr>

</xml_diff>

<commit_message>
Completed entire poster work
</commit_message>
<xml_diff>
--- a/Final project/Poster.pptx
+++ b/Final project/Poster.pptx
@@ -9785,7 +9785,7 @@
                 <a:cs typeface="Verdana" pitchFamily="-108" charset="0"/>
                 <a:sym typeface="Verdana" pitchFamily="-108" charset="0"/>
               </a:rPr>
-              <a:t>Results</a:t>
+              <a:t>Model Development</a:t>
             </a:r>
             <a:r>
               <a:rPr lang="en-US" sz="4000" b="1" dirty="0">
@@ -11159,7 +11159,7 @@
                 <a:latin typeface="+mj-lt"/>
                 <a:cs typeface="Arial" panose="020B0604020202020204" pitchFamily="34" charset="0"/>
               </a:rPr>
-              <a:t>Removed 16 Outliers from the Weather and EMS dataset.</a:t>
+              <a:t>Removed about 0.22M outliers from the Weather and EMS dataset.</a:t>
             </a:r>
           </a:p>
           <a:p>
@@ -11178,7 +11178,7 @@
                 <a:latin typeface="+mj-lt"/>
                 <a:cs typeface="Arial" panose="020B0604020202020204" pitchFamily="34" charset="0"/>
               </a:rPr>
-              <a:t>Removed 2100 N/A values from EMS dataset.</a:t>
+              <a:t>Removed about 3.7M rows with N/A values from EMS dataset.</a:t>
             </a:r>
           </a:p>
           <a:p>
@@ -11235,8 +11235,8 @@
         </p:nvSpPr>
         <p:spPr>
           <a:xfrm>
-            <a:off x="10738308" y="26446539"/>
-            <a:ext cx="9522596" cy="2862322"/>
+            <a:off x="10738308" y="26481543"/>
+            <a:ext cx="9522596" cy="10710624"/>
           </a:xfrm>
           <a:prstGeom prst="rect">
             <a:avLst/>
@@ -11266,8 +11266,93 @@
                 <a:latin typeface="+mj-lt"/>
                 <a:cs typeface="Arial" panose="020B0604020202020204" pitchFamily="34" charset="0"/>
               </a:rPr>
-              <a:t>4 regression models were built for evaluation:</a:t>
+              <a:t>The final merged dataset obtained after joining the EMS and weather datasets on date column had about 0.36M rows.</a:t>
             </a:r>
+          </a:p>
+          <a:p>
+            <a:pPr marL="571500" indent="-571500" algn="just">
+              <a:spcBef>
+                <a:spcPts val="0"/>
+              </a:spcBef>
+              <a:spcAft>
+                <a:spcPts val="0"/>
+              </a:spcAft>
+              <a:buFont typeface="Wingdings" panose="05000000000000000000" pitchFamily="2" charset="2"/>
+              <a:buChar char="Ø"/>
+            </a:pPr>
+            <a:r>
+              <a:rPr lang="en-US" sz="3600" dirty="0">
+                <a:solidFill>
+                  <a:schemeClr val="tx1"/>
+                </a:solidFill>
+                <a:latin typeface="+mj-lt"/>
+                <a:cs typeface="Arial" panose="020B0604020202020204" pitchFamily="34" charset="0"/>
+              </a:rPr>
+              <a:t>This number is after all data filtering and cleaning were done and dataset was ready for model building.</a:t>
+            </a:r>
+          </a:p>
+          <a:p>
+            <a:pPr marL="571500" indent="-571500" algn="just">
+              <a:spcBef>
+                <a:spcPts val="0"/>
+              </a:spcBef>
+              <a:spcAft>
+                <a:spcPts val="0"/>
+              </a:spcAft>
+              <a:buFont typeface="Wingdings" panose="05000000000000000000" pitchFamily="2" charset="2"/>
+              <a:buChar char="Ø"/>
+            </a:pPr>
+            <a:r>
+              <a:rPr lang="en-US" sz="3600" dirty="0">
+                <a:solidFill>
+                  <a:schemeClr val="tx1"/>
+                </a:solidFill>
+                <a:latin typeface="+mj-lt"/>
+                <a:cs typeface="Arial" panose="020B0604020202020204" pitchFamily="34" charset="0"/>
+              </a:rPr>
+              <a:t>Models performed significantly better on datasets without outliers and N/A values.</a:t>
+            </a:r>
+          </a:p>
+          <a:p>
+            <a:pPr marL="571500" indent="-571500" algn="just">
+              <a:spcBef>
+                <a:spcPts val="0"/>
+              </a:spcBef>
+              <a:spcAft>
+                <a:spcPts val="0"/>
+              </a:spcAft>
+              <a:buFont typeface="Wingdings" panose="05000000000000000000" pitchFamily="2" charset="2"/>
+              <a:buChar char="Ø"/>
+            </a:pPr>
+            <a:r>
+              <a:rPr lang="en-US" sz="3600" dirty="0">
+                <a:solidFill>
+                  <a:schemeClr val="tx1"/>
+                </a:solidFill>
+                <a:latin typeface="+mj-lt"/>
+                <a:cs typeface="Arial" panose="020B0604020202020204" pitchFamily="34" charset="0"/>
+              </a:rPr>
+              <a:t>Following 4 regression models were built for evaluation:</a:t>
+            </a:r>
+          </a:p>
+          <a:p>
+            <a:pPr marL="571500" indent="-571500" algn="just">
+              <a:spcBef>
+                <a:spcPts val="0"/>
+              </a:spcBef>
+              <a:spcAft>
+                <a:spcPts val="0"/>
+              </a:spcAft>
+              <a:buFont typeface="Wingdings" panose="05000000000000000000" pitchFamily="2" charset="2"/>
+              <a:buChar char="Ø"/>
+            </a:pPr>
+            <a:endParaRPr lang="en-US" sz="1200" dirty="0">
+              <a:solidFill>
+                <a:schemeClr val="tx1"/>
+              </a:solidFill>
+              <a:latin typeface="+mj-lt"/>
+              <a:cs typeface="Arial" panose="020B0604020202020204" pitchFamily="34" charset="0"/>
+            </a:endParaRPr>
           </a:p>
           <a:p>
             <a:pPr marL="975463" lvl="1" indent="-571500" algn="just">
@@ -11357,6 +11442,66 @@
               <a:t>K-Nearest Neighbors</a:t>
             </a:r>
           </a:p>
+          <a:p>
+            <a:pPr marL="975463" lvl="1" indent="-571500" algn="just">
+              <a:spcBef>
+                <a:spcPts val="0"/>
+              </a:spcBef>
+              <a:spcAft>
+                <a:spcPts val="0"/>
+              </a:spcAft>
+              <a:buFont typeface="Wingdings" panose="05000000000000000000" pitchFamily="2" charset="2"/>
+              <a:buChar char="v"/>
+            </a:pPr>
+            <a:endParaRPr lang="en-US" sz="1200" dirty="0">
+              <a:solidFill>
+                <a:schemeClr val="tx1"/>
+              </a:solidFill>
+              <a:latin typeface="+mj-lt"/>
+              <a:cs typeface="Arial" panose="020B0604020202020204" pitchFamily="34" charset="0"/>
+            </a:endParaRPr>
+          </a:p>
+          <a:p>
+            <a:pPr marL="571500" indent="-571500" algn="just">
+              <a:spcBef>
+                <a:spcPts val="0"/>
+              </a:spcBef>
+              <a:spcAft>
+                <a:spcPts val="0"/>
+              </a:spcAft>
+              <a:buFont typeface="Wingdings" panose="05000000000000000000" pitchFamily="2" charset="2"/>
+              <a:buChar char="Ø"/>
+            </a:pPr>
+            <a:r>
+              <a:rPr lang="en-US" sz="3600" dirty="0">
+                <a:solidFill>
+                  <a:schemeClr val="tx1"/>
+                </a:solidFill>
+                <a:latin typeface="+mj-lt"/>
+                <a:cs typeface="Arial" panose="020B0604020202020204" pitchFamily="34" charset="0"/>
+              </a:rPr>
+              <a:t>Hyper tuning turned out to be an essential tool to optimize model parameters and maximize the performances of all the four models.</a:t>
+            </a:r>
+          </a:p>
+          <a:p>
+            <a:pPr marL="571500" indent="-571500" algn="just">
+              <a:spcBef>
+                <a:spcPts val="0"/>
+              </a:spcBef>
+              <a:spcAft>
+                <a:spcPts val="0"/>
+              </a:spcAft>
+              <a:buFont typeface="Wingdings" panose="05000000000000000000" pitchFamily="2" charset="2"/>
+              <a:buChar char="Ø"/>
+            </a:pPr>
+            <a:endParaRPr lang="en-US" sz="3600" dirty="0">
+              <a:solidFill>
+                <a:schemeClr val="tx1"/>
+              </a:solidFill>
+              <a:latin typeface="+mj-lt"/>
+              <a:cs typeface="Arial" panose="020B0604020202020204" pitchFamily="34" charset="0"/>
+            </a:endParaRPr>
+          </a:p>
         </p:txBody>
       </p:sp>
       <p:grpSp>
@@ -11374,9 +11519,9 @@
         <p:grpSpPr>
           <a:xfrm>
             <a:off x="20777143" y="25565000"/>
-            <a:ext cx="9619110" cy="1527870"/>
+            <a:ext cx="9619110" cy="10910531"/>
             <a:chOff x="20777143" y="25565000"/>
-            <a:chExt cx="9619110" cy="1527870"/>
+            <a:chExt cx="9619110" cy="10910531"/>
           </a:xfrm>
         </p:grpSpPr>
         <p:sp>
@@ -11583,7 +11728,7 @@
                   <a:cs typeface="Verdana" pitchFamily="-108" charset="0"/>
                   <a:sym typeface="Verdana" pitchFamily="-108" charset="0"/>
                 </a:rPr>
-                <a:t>Conclusion</a:t>
+                <a:t>Results and Conclusion</a:t>
               </a:r>
               <a:r>
                 <a:rPr lang="en-US" sz="4000" b="1" dirty="0">
@@ -11614,8 +11759,8 @@
           </p:nvSpPr>
           <p:spPr>
             <a:xfrm>
-              <a:off x="20777143" y="26446539"/>
-              <a:ext cx="9522596" cy="646331"/>
+              <a:off x="20777143" y="26411237"/>
+              <a:ext cx="9522596" cy="10064294"/>
             </a:xfrm>
             <a:prstGeom prst="rect">
               <a:avLst/>
@@ -11645,7 +11790,113 @@
                   <a:latin typeface="+mj-lt"/>
                   <a:cs typeface="Arial" panose="020B0604020202020204" pitchFamily="34" charset="0"/>
                 </a:rPr>
-                <a:t>4 regression models were built for evaluation:</a:t>
+                <a:t>Weather data and EMS response times are co-related, meaning it proves the initial hypothesis that weather has an impact on the ambulance response times.</a:t>
+              </a:r>
+            </a:p>
+            <a:p>
+              <a:pPr marL="571500" indent="-571500" algn="just">
+                <a:spcBef>
+                  <a:spcPts val="0"/>
+                </a:spcBef>
+                <a:spcAft>
+                  <a:spcPts val="0"/>
+                </a:spcAft>
+                <a:buFont typeface="Wingdings" panose="05000000000000000000" pitchFamily="2" charset="2"/>
+                <a:buChar char="Ø"/>
+              </a:pPr>
+              <a:r>
+                <a:rPr lang="en-US" sz="3600" dirty="0">
+                  <a:solidFill>
+                    <a:schemeClr val="tx1"/>
+                  </a:solidFill>
+                  <a:latin typeface="+mj-lt"/>
+                  <a:cs typeface="Arial" panose="020B0604020202020204" pitchFamily="34" charset="0"/>
+                </a:rPr>
+                <a:t>All the four regression models namely, Linear Regression, SVM, Random Forest, and KNN were built on the same dataset and evaluated basis their accuracy, root mean square error, deviation from the actual expected result, and other evaluation techniques.</a:t>
+              </a:r>
+            </a:p>
+            <a:p>
+              <a:pPr marL="571500" indent="-571500" algn="just">
+                <a:spcBef>
+                  <a:spcPts val="0"/>
+                </a:spcBef>
+                <a:spcAft>
+                  <a:spcPts val="0"/>
+                </a:spcAft>
+                <a:buFont typeface="Wingdings" panose="05000000000000000000" pitchFamily="2" charset="2"/>
+                <a:buChar char="Ø"/>
+              </a:pPr>
+              <a:r>
+                <a:rPr lang="en-US" sz="3600" dirty="0">
+                  <a:solidFill>
+                    <a:schemeClr val="tx1"/>
+                  </a:solidFill>
+                  <a:latin typeface="+mj-lt"/>
+                  <a:cs typeface="Arial" panose="020B0604020202020204" pitchFamily="34" charset="0"/>
+                </a:rPr>
+                <a:t>Random Forest had the highest accuracy and least mean square error amongst other 4 models which means that it is best suited to predict ambulance response times for our problem.</a:t>
+              </a:r>
+            </a:p>
+            <a:p>
+              <a:pPr marL="571500" indent="-571500" algn="just">
+                <a:spcBef>
+                  <a:spcPts val="0"/>
+                </a:spcBef>
+                <a:spcAft>
+                  <a:spcPts val="0"/>
+                </a:spcAft>
+                <a:buFont typeface="Wingdings" panose="05000000000000000000" pitchFamily="2" charset="2"/>
+                <a:buChar char="Ø"/>
+              </a:pPr>
+              <a:r>
+                <a:rPr lang="en-US" sz="3600" dirty="0">
+                  <a:solidFill>
+                    <a:schemeClr val="tx1"/>
+                  </a:solidFill>
+                  <a:latin typeface="+mj-lt"/>
+                  <a:cs typeface="Arial" panose="020B0604020202020204" pitchFamily="34" charset="0"/>
+                </a:rPr>
+                <a:t>The aim of the project was to analyze the impact of Weather on EMS response times using the concepts taught by Prof. </a:t>
+              </a:r>
+              <a:r>
+                <a:rPr lang="en-US" sz="3600" dirty="0" err="1">
+                  <a:solidFill>
+                    <a:schemeClr val="tx1"/>
+                  </a:solidFill>
+                  <a:latin typeface="+mj-lt"/>
+                  <a:cs typeface="Arial" panose="020B0604020202020204" pitchFamily="34" charset="0"/>
+                </a:rPr>
+                <a:t>Thilanka</a:t>
+              </a:r>
+              <a:r>
+                <a:rPr lang="en-US" sz="3600" dirty="0">
+                  <a:solidFill>
+                    <a:schemeClr val="tx1"/>
+                  </a:solidFill>
+                  <a:latin typeface="+mj-lt"/>
+                  <a:cs typeface="Arial" panose="020B0604020202020204" pitchFamily="34" charset="0"/>
+                </a:rPr>
+                <a:t> </a:t>
+              </a:r>
+              <a:r>
+                <a:rPr lang="en-US" sz="3600" dirty="0" err="1">
+                  <a:solidFill>
+                    <a:schemeClr val="tx1"/>
+                  </a:solidFill>
+                  <a:latin typeface="+mj-lt"/>
+                  <a:cs typeface="Arial" panose="020B0604020202020204" pitchFamily="34" charset="0"/>
+                </a:rPr>
+                <a:t>Munasinghe</a:t>
+              </a:r>
+              <a:r>
+                <a:rPr lang="en-US" sz="3600" dirty="0">
+                  <a:solidFill>
+                    <a:schemeClr val="tx1"/>
+                  </a:solidFill>
+                  <a:latin typeface="+mj-lt"/>
+                  <a:cs typeface="Arial" panose="020B0604020202020204" pitchFamily="34" charset="0"/>
+                </a:rPr>
+                <a:t> in his Data Analytics class.</a:t>
               </a:r>
             </a:p>
           </p:txBody>

</xml_diff>

<commit_message>
Completed poster, added 8 pages of project report
</commit_message>
<xml_diff>
--- a/Final project/Poster.pptx
+++ b/Final project/Poster.pptx
@@ -9009,6 +9009,18 @@
                 </a:tabLst>
               </a:pPr>
               <a:r>
+                <a:rPr lang="en-US" sz="4400" b="1">
+                  <a:solidFill>
+                    <a:schemeClr val="bg1"/>
+                  </a:solidFill>
+                  <a:latin typeface="+mj-lt"/>
+                  <a:ea typeface="Verdana" pitchFamily="-108" charset="0"/>
+                  <a:cs typeface="Verdana" pitchFamily="-108" charset="0"/>
+                  <a:sym typeface="Verdana" pitchFamily="-108" charset="0"/>
+                </a:rPr>
+                <a:t>Data </a:t>
+              </a:r>
+              <a:r>
                 <a:rPr lang="en-US" sz="4400" b="1" dirty="0">
                   <a:solidFill>
                     <a:schemeClr val="bg1"/>
@@ -9018,7 +9030,7 @@
                   <a:cs typeface="Verdana" pitchFamily="-108" charset="0"/>
                   <a:sym typeface="Verdana" pitchFamily="-108" charset="0"/>
                 </a:rPr>
-                <a:t>Data Analysis</a:t>
+                <a:t>Analysis</a:t>
               </a:r>
             </a:p>
           </p:txBody>

</xml_diff>

<commit_message>
Final code changes - commit
</commit_message>
<xml_diff>
--- a/Final project/Poster.pptx
+++ b/Final project/Poster.pptx
@@ -150,6 +150,15 @@
     </a:lvl9pPr>
   </p:defaultTextStyle>
   <p:extLst>
+    <p:ext uri="{521415D9-36F7-43E2-AB2F-B90AF26B5E84}">
+      <p14:sectionLst xmlns:p14="http://schemas.microsoft.com/office/powerpoint/2010/main">
+        <p14:section name="Untitled Section" id="{D62E34EC-088B-4D58-AD9C-20627365B738}">
+          <p14:sldIdLst>
+            <p14:sldId id="256"/>
+          </p14:sldIdLst>
+        </p14:section>
+      </p14:sectionLst>
+    </p:ext>
     <p:ext uri="{EFAFB233-063F-42B5-8137-9DF3F51BA10A}">
       <p15:sldGuideLst xmlns:p15="http://schemas.microsoft.com/office/powerpoint/2012/main">
         <p15:guide id="1" orient="horz" pos="13133" userDrawn="1">
@@ -1438,7 +1447,7 @@
   <dgm:whole/>
   <dgm:extLst>
     <a:ext uri="http://schemas.microsoft.com/office/drawing/2008/diagram">
-      <dsp:dataModelExt xmlns:dsp="http://schemas.microsoft.com/office/drawing/2008/diagram" relId="rId17" minVer="http://schemas.openxmlformats.org/drawingml/2006/diagram"/>
+      <dsp:dataModelExt xmlns:dsp="http://schemas.microsoft.com/office/drawing/2008/diagram" relId="rId16" minVer="http://schemas.openxmlformats.org/drawingml/2006/diagram"/>
     </a:ext>
     <a:ext uri="{C62137D5-CB1D-491B-B009-E17868A290BF}">
       <dgm14:recolorImg xmlns:dgm14="http://schemas.microsoft.com/office/drawing/2010/diagram" val="1"/>
@@ -7662,7 +7671,7 @@
                 <a:cs typeface="Arial Black" charset="0"/>
                 <a:sym typeface="Arial Black" pitchFamily="-108" charset="0"/>
               </a:rPr>
-              <a:t>Rensselaer Polytechnic Institute, Tetherless World Constellation, Troy, NY, United States</a:t>
+              <a:t>Rensselaer Polytechnic Institute, Troy, NY, United States</a:t>
             </a:r>
             <a:br>
               <a:rPr lang="en-US" sz="3200" b="1" dirty="0">
@@ -8714,7 +8723,7 @@
                   <a:latin typeface="+mj-lt"/>
                   <a:cs typeface="Arial" panose="020B0604020202020204" pitchFamily="34" charset="0"/>
                 </a:rPr>
-                <a:t>Exploratory Data Analysis</a:t>
+                <a:t>EDA</a:t>
               </a:r>
             </a:p>
             <a:p>
@@ -8733,7 +8742,7 @@
                   <a:latin typeface="+mj-lt"/>
                   <a:cs typeface="Arial" panose="020B0604020202020204" pitchFamily="34" charset="0"/>
                 </a:rPr>
-                <a:t>Performing initial investigation on data to discover patterns and to spot anomalies.</a:t>
+                <a:t>Performing initial investigation on data to discover patterns and to detect abnormality.</a:t>
               </a:r>
             </a:p>
             <a:p>
@@ -8809,7 +8818,7 @@
                   <a:latin typeface="+mj-lt"/>
                   <a:cs typeface="Arial" panose="020B0604020202020204" pitchFamily="34" charset="0"/>
                 </a:rPr>
-                <a:t>Evaluating the accuracy of these models and determining which works best for given set of data.</a:t>
+                <a:t>Evaluating the accuracy of these models and determining which works best for given weather and EMS data.</a:t>
               </a:r>
             </a:p>
           </p:txBody>
@@ -9829,9 +9838,9 @@
         <p:grpSpPr>
           <a:xfrm>
             <a:off x="10700920" y="36545840"/>
-            <a:ext cx="19680749" cy="4566207"/>
+            <a:ext cx="19680749" cy="4277987"/>
             <a:chOff x="576544" y="12808368"/>
-            <a:chExt cx="12222089" cy="7476906"/>
+            <a:chExt cx="12222089" cy="7004962"/>
           </a:xfrm>
         </p:grpSpPr>
         <p:sp>
@@ -9849,7 +9858,7 @@
           <p:spPr>
             <a:xfrm>
               <a:off x="576544" y="14219299"/>
-              <a:ext cx="12222089" cy="6065975"/>
+              <a:ext cx="12222089" cy="5594031"/>
             </a:xfrm>
             <a:prstGeom prst="rect">
               <a:avLst/>
@@ -9861,288 +9870,204 @@
             </a:bodyPr>
             <a:lstStyle/>
             <a:p>
-              <a:pPr marL="457200" indent="-457200" algn="just">
-                <a:lnSpc>
-                  <a:spcPct val="110000"/>
-                </a:lnSpc>
+              <a:pPr marL="571500" marR="0" lvl="0" indent="-571500">
+                <a:spcBef>
+                  <a:spcPts val="0"/>
+                </a:spcBef>
+                <a:spcAft>
+                  <a:spcPts val="0"/>
+                </a:spcAft>
                 <a:buFont typeface="Wingdings" panose="05000000000000000000" pitchFamily="2" charset="2"/>
                 <a:buChar char="Ø"/>
-                <a:tabLst>
-                  <a:tab pos="163281" algn="l"/>
-                  <a:tab pos="327298" algn="l"/>
-                  <a:tab pos="491309" algn="l"/>
-                  <a:tab pos="655325" algn="l"/>
-                  <a:tab pos="819336" algn="l"/>
-                  <a:tab pos="983353" algn="l"/>
-                  <a:tab pos="1147363" algn="l"/>
-                  <a:tab pos="1311379" algn="l"/>
-                  <a:tab pos="1475396" algn="l"/>
-                  <a:tab pos="1639406" algn="l"/>
-                  <a:tab pos="1803423" algn="l"/>
-                  <a:tab pos="1967434" algn="l"/>
-                </a:tabLst>
               </a:pPr>
               <a:r>
-                <a:rPr lang="en-US" sz="3600" dirty="0">
-                  <a:solidFill>
-                    <a:schemeClr val="tx1"/>
-                  </a:solidFill>
+                <a:rPr lang="en-IN" sz="3600" dirty="0">
+                  <a:effectLst/>
                   <a:latin typeface="+mj-lt"/>
-                  <a:ea typeface="Verdana" pitchFamily="-108" charset="0"/>
-                  <a:cs typeface="Verdana" pitchFamily="-108" charset="0"/>
-                  <a:sym typeface="Verdana" pitchFamily="-108" charset="0"/>
+                  <a:ea typeface="Calibri" panose="020F0502020204030204" pitchFamily="34" charset="0"/>
+                  <a:cs typeface="Times New Roman" panose="02020603050405020304" pitchFamily="18" charset="0"/>
                 </a:rPr>
                 <a:t>R Basics: </a:t>
               </a:r>
               <a:r>
-                <a:rPr lang="en-US" sz="3600" dirty="0">
+                <a:rPr lang="en-IN" sz="3600" u="sng" dirty="0">
                   <a:solidFill>
-                    <a:schemeClr val="tx1"/>
+                    <a:srgbClr val="0563C1"/>
                   </a:solidFill>
                   <a:latin typeface="+mj-lt"/>
-                  <a:ea typeface="Verdana" pitchFamily="-108" charset="0"/>
-                  <a:cs typeface="Verdana" pitchFamily="-108" charset="0"/>
-                  <a:sym typeface="Verdana" pitchFamily="-108" charset="0"/>
+                  <a:ea typeface="Calibri" panose="020F0502020204030204" pitchFamily="34" charset="0"/>
+                  <a:cs typeface="Times New Roman" panose="02020603050405020304" pitchFamily="18" charset="0"/>
                   <a:hlinkClick r:id="rId7"/>
                 </a:rPr>
                 <a:t>https://towardsdatascience.com/r-basics-everything-you-need-to-know-to-get-started-with-r-10c8e566d7b3</a:t>
               </a:r>
-              <a:endParaRPr lang="en-US" sz="3600" dirty="0">
+              <a:endParaRPr lang="en-IN" sz="3600" u="sng" dirty="0">
                 <a:solidFill>
-                  <a:schemeClr val="tx1"/>
+                  <a:srgbClr val="0563C1"/>
                 </a:solidFill>
                 <a:latin typeface="+mj-lt"/>
-                <a:ea typeface="Verdana" pitchFamily="-108" charset="0"/>
-                <a:cs typeface="Verdana" pitchFamily="-108" charset="0"/>
-                <a:sym typeface="Verdana" pitchFamily="-108" charset="0"/>
+                <a:ea typeface="Calibri" panose="020F0502020204030204" pitchFamily="34" charset="0"/>
+                <a:cs typeface="Times New Roman" panose="02020603050405020304" pitchFamily="18" charset="0"/>
               </a:endParaRPr>
             </a:p>
             <a:p>
-              <a:pPr marL="457200" indent="-457200" algn="just">
-                <a:lnSpc>
-                  <a:spcPct val="110000"/>
-                </a:lnSpc>
+              <a:pPr marL="571500" marR="0" lvl="0" indent="-571500">
+                <a:spcBef>
+                  <a:spcPts val="0"/>
+                </a:spcBef>
+                <a:spcAft>
+                  <a:spcPts val="0"/>
+                </a:spcAft>
                 <a:buFont typeface="Wingdings" panose="05000000000000000000" pitchFamily="2" charset="2"/>
                 <a:buChar char="Ø"/>
-                <a:tabLst>
-                  <a:tab pos="163281" algn="l"/>
-                  <a:tab pos="327298" algn="l"/>
-                  <a:tab pos="491309" algn="l"/>
-                  <a:tab pos="655325" algn="l"/>
-                  <a:tab pos="819336" algn="l"/>
-                  <a:tab pos="983353" algn="l"/>
-                  <a:tab pos="1147363" algn="l"/>
-                  <a:tab pos="1311379" algn="l"/>
-                  <a:tab pos="1475396" algn="l"/>
-                  <a:tab pos="1639406" algn="l"/>
-                  <a:tab pos="1803423" algn="l"/>
-                  <a:tab pos="1967434" algn="l"/>
-                </a:tabLst>
               </a:pPr>
               <a:r>
-                <a:rPr lang="en-US" sz="3600" dirty="0">
-                  <a:solidFill>
-                    <a:schemeClr val="tx1"/>
-                  </a:solidFill>
+                <a:rPr lang="en-IN" sz="3600" dirty="0" err="1">
+                  <a:effectLst/>
                   <a:latin typeface="+mj-lt"/>
-                  <a:ea typeface="Verdana" pitchFamily="-108" charset="0"/>
-                  <a:cs typeface="Verdana" pitchFamily="-108" charset="0"/>
-                  <a:sym typeface="Verdana" pitchFamily="-108" charset="0"/>
+                  <a:ea typeface="Calibri" panose="020F0502020204030204" pitchFamily="34" charset="0"/>
+                  <a:cs typeface="Times New Roman" panose="02020603050405020304" pitchFamily="18" charset="0"/>
                 </a:rPr>
-                <a:t>Scrape-R Package: </a:t>
+                <a:t>GGplot</a:t>
               </a:r>
               <a:r>
-                <a:rPr lang="en-US" sz="3600" dirty="0">
+                <a:rPr lang="en-IN" sz="3600" dirty="0">
+                  <a:effectLst/>
+                  <a:latin typeface="+mj-lt"/>
+                  <a:ea typeface="Calibri" panose="020F0502020204030204" pitchFamily="34" charset="0"/>
+                  <a:cs typeface="Times New Roman" panose="02020603050405020304" pitchFamily="18" charset="0"/>
+                </a:rPr>
+                <a:t> in R</a:t>
+              </a:r>
+              <a:r>
+                <a:rPr lang="en-IN" sz="3600">
+                  <a:effectLst/>
+                  <a:latin typeface="+mj-lt"/>
+                  <a:ea typeface="Calibri" panose="020F0502020204030204" pitchFamily="34" charset="0"/>
+                  <a:cs typeface="Times New Roman" panose="02020603050405020304" pitchFamily="18" charset="0"/>
+                </a:rPr>
+                <a:t>: </a:t>
+              </a:r>
+              <a:r>
+                <a:rPr lang="en-IN" sz="3600" u="sng">
                   <a:solidFill>
-                    <a:schemeClr val="tx1"/>
+                    <a:srgbClr val="0563C1"/>
                   </a:solidFill>
+                  <a:effectLst/>
                   <a:latin typeface="+mj-lt"/>
-                  <a:ea typeface="Verdana" pitchFamily="-108" charset="0"/>
-                  <a:cs typeface="Verdana" pitchFamily="-108" charset="0"/>
-                  <a:sym typeface="Verdana" pitchFamily="-108" charset="0"/>
+                  <a:ea typeface="Calibri" panose="020F0502020204030204" pitchFamily="34" charset="0"/>
+                  <a:cs typeface="Times New Roman" panose="02020603050405020304" pitchFamily="18" charset="0"/>
                   <a:hlinkClick r:id="rId8"/>
                 </a:rPr>
-                <a:t>https://cran.r-project.org/web/packages/scrapeR/scrapeR.pdf</a:t>
+                <a:t>https://www.youtube.com/watch?v=E_KCbC6sBv0</a:t>
               </a:r>
-              <a:endParaRPr lang="en-US" sz="3600" dirty="0">
+              <a:endParaRPr lang="en-IN" sz="3600" u="sng" dirty="0">
                 <a:solidFill>
-                  <a:schemeClr val="tx1"/>
+                  <a:srgbClr val="0563C1"/>
                 </a:solidFill>
                 <a:latin typeface="+mj-lt"/>
-                <a:ea typeface="Verdana" pitchFamily="-108" charset="0"/>
-                <a:cs typeface="Verdana" pitchFamily="-108" charset="0"/>
-                <a:sym typeface="Verdana" pitchFamily="-108" charset="0"/>
+                <a:ea typeface="Calibri" panose="020F0502020204030204" pitchFamily="34" charset="0"/>
+                <a:cs typeface="Times New Roman" panose="02020603050405020304" pitchFamily="18" charset="0"/>
               </a:endParaRPr>
             </a:p>
             <a:p>
-              <a:pPr marL="457200" indent="-457200" algn="just">
-                <a:lnSpc>
-                  <a:spcPct val="110000"/>
-                </a:lnSpc>
+              <a:pPr marL="571500" marR="0" lvl="0" indent="-571500">
+                <a:spcBef>
+                  <a:spcPts val="0"/>
+                </a:spcBef>
+                <a:spcAft>
+                  <a:spcPts val="0"/>
+                </a:spcAft>
                 <a:buFont typeface="Wingdings" panose="05000000000000000000" pitchFamily="2" charset="2"/>
                 <a:buChar char="Ø"/>
-                <a:tabLst>
-                  <a:tab pos="163281" algn="l"/>
-                  <a:tab pos="327298" algn="l"/>
-                  <a:tab pos="491309" algn="l"/>
-                  <a:tab pos="655325" algn="l"/>
-                  <a:tab pos="819336" algn="l"/>
-                  <a:tab pos="983353" algn="l"/>
-                  <a:tab pos="1147363" algn="l"/>
-                  <a:tab pos="1311379" algn="l"/>
-                  <a:tab pos="1475396" algn="l"/>
-                  <a:tab pos="1639406" algn="l"/>
-                  <a:tab pos="1803423" algn="l"/>
-                  <a:tab pos="1967434" algn="l"/>
-                </a:tabLst>
               </a:pPr>
               <a:r>
-                <a:rPr lang="en-US" sz="3600" dirty="0">
-                  <a:solidFill>
-                    <a:schemeClr val="tx1"/>
-                  </a:solidFill>
+                <a:rPr lang="en-IN" sz="3600">
+                  <a:effectLst/>
                   <a:latin typeface="+mj-lt"/>
-                  <a:ea typeface="Verdana" pitchFamily="-108" charset="0"/>
-                  <a:cs typeface="Verdana" pitchFamily="-108" charset="0"/>
-                  <a:sym typeface="Verdana" pitchFamily="-108" charset="0"/>
+                  <a:ea typeface="Calibri" panose="020F0502020204030204" pitchFamily="34" charset="0"/>
+                  <a:cs typeface="Times New Roman" panose="02020603050405020304" pitchFamily="18" charset="0"/>
                 </a:rPr>
-                <a:t>Read Excel File in R: </a:t>
+                <a:t>Data </a:t>
               </a:r>
               <a:r>
-                <a:rPr lang="en-US" sz="3600" dirty="0">
+                <a:rPr lang="en-IN" sz="3600" dirty="0">
+                  <a:effectLst/>
+                  <a:latin typeface="+mj-lt"/>
+                  <a:ea typeface="Calibri" panose="020F0502020204030204" pitchFamily="34" charset="0"/>
+                  <a:cs typeface="Times New Roman" panose="02020603050405020304" pitchFamily="18" charset="0"/>
+                </a:rPr>
+                <a:t>munging in R: </a:t>
+              </a:r>
+              <a:r>
+                <a:rPr lang="en-IN" sz="3600" u="sng" dirty="0">
                   <a:solidFill>
-                    <a:schemeClr val="tx1"/>
+                    <a:srgbClr val="0563C1"/>
                   </a:solidFill>
+                  <a:effectLst/>
                   <a:latin typeface="+mj-lt"/>
-                  <a:ea typeface="Verdana" pitchFamily="-108" charset="0"/>
-                  <a:cs typeface="Verdana" pitchFamily="-108" charset="0"/>
-                  <a:sym typeface="Verdana" pitchFamily="-108" charset="0"/>
+                  <a:ea typeface="Calibri" panose="020F0502020204030204" pitchFamily="34" charset="0"/>
+                  <a:cs typeface="Times New Roman" panose="02020603050405020304" pitchFamily="18" charset="0"/>
                   <a:hlinkClick r:id="rId9"/>
                 </a:rPr>
-                <a:t>https://www.datacamp.com/community/tutorials/r-tutorial-read-excel-into-r</a:t>
+                <a:t>https://www.toptal.com/r/boost-your-data-munging-with-r</a:t>
               </a:r>
-              <a:endParaRPr lang="en-US" sz="3600" dirty="0">
+              <a:endParaRPr lang="en-IN" sz="3600" u="sng" dirty="0">
                 <a:solidFill>
-                  <a:schemeClr val="tx1"/>
+                  <a:srgbClr val="0563C1"/>
                 </a:solidFill>
                 <a:latin typeface="+mj-lt"/>
-                <a:ea typeface="Verdana" pitchFamily="-108" charset="0"/>
-                <a:cs typeface="Verdana" pitchFamily="-108" charset="0"/>
-                <a:sym typeface="Verdana" pitchFamily="-108" charset="0"/>
+                <a:ea typeface="Calibri" panose="020F0502020204030204" pitchFamily="34" charset="0"/>
+                <a:cs typeface="Times New Roman" panose="02020603050405020304" pitchFamily="18" charset="0"/>
               </a:endParaRPr>
             </a:p>
             <a:p>
-              <a:pPr marL="457200" indent="-457200" algn="just">
-                <a:lnSpc>
-                  <a:spcPct val="110000"/>
-                </a:lnSpc>
+              <a:pPr marL="571500" marR="0" lvl="0" indent="-571500">
+                <a:spcBef>
+                  <a:spcPts val="0"/>
+                </a:spcBef>
+                <a:spcAft>
+                  <a:spcPts val="0"/>
+                </a:spcAft>
                 <a:buFont typeface="Wingdings" panose="05000000000000000000" pitchFamily="2" charset="2"/>
                 <a:buChar char="Ø"/>
-                <a:tabLst>
-                  <a:tab pos="163281" algn="l"/>
-                  <a:tab pos="327298" algn="l"/>
-                  <a:tab pos="491309" algn="l"/>
-                  <a:tab pos="655325" algn="l"/>
-                  <a:tab pos="819336" algn="l"/>
-                  <a:tab pos="983353" algn="l"/>
-                  <a:tab pos="1147363" algn="l"/>
-                  <a:tab pos="1311379" algn="l"/>
-                  <a:tab pos="1475396" algn="l"/>
-                  <a:tab pos="1639406" algn="l"/>
-                  <a:tab pos="1803423" algn="l"/>
-                  <a:tab pos="1967434" algn="l"/>
-                </a:tabLst>
               </a:pPr>
               <a:r>
-                <a:rPr lang="en-US" sz="3600" dirty="0">
-                  <a:solidFill>
-                    <a:schemeClr val="tx1"/>
-                  </a:solidFill>
+                <a:rPr lang="en-IN" sz="3600" dirty="0" err="1">
+                  <a:effectLst/>
                   <a:latin typeface="+mj-lt"/>
-                  <a:ea typeface="Verdana" pitchFamily="-108" charset="0"/>
-                  <a:cs typeface="Verdana" pitchFamily="-108" charset="0"/>
-                  <a:sym typeface="Verdana" pitchFamily="-108" charset="0"/>
+                  <a:ea typeface="Calibri" panose="020F0502020204030204" pitchFamily="34" charset="0"/>
+                  <a:cs typeface="Times New Roman" panose="02020603050405020304" pitchFamily="18" charset="0"/>
                 </a:rPr>
-                <a:t>Dealing with missing data in R: </a:t>
+                <a:t>InterQuartile</a:t>
               </a:r>
               <a:r>
-                <a:rPr lang="en-US" sz="3600" dirty="0">
+                <a:rPr lang="en-IN" sz="3600" dirty="0">
+                  <a:effectLst/>
+                  <a:latin typeface="+mj-lt"/>
+                  <a:ea typeface="Calibri" panose="020F0502020204030204" pitchFamily="34" charset="0"/>
+                  <a:cs typeface="Times New Roman" panose="02020603050405020304" pitchFamily="18" charset="0"/>
+                </a:rPr>
+                <a:t> Range in R: </a:t>
+              </a:r>
+              <a:r>
+                <a:rPr lang="en-IN" sz="3600" u="sng" dirty="0">
                   <a:solidFill>
-                    <a:schemeClr val="tx1"/>
+                    <a:srgbClr val="0563C1"/>
                   </a:solidFill>
+                  <a:effectLst/>
                   <a:latin typeface="+mj-lt"/>
-                  <a:ea typeface="Verdana" pitchFamily="-108" charset="0"/>
-                  <a:cs typeface="Verdana" pitchFamily="-108" charset="0"/>
-                  <a:sym typeface="Verdana" pitchFamily="-108" charset="0"/>
+                  <a:ea typeface="Calibri" panose="020F0502020204030204" pitchFamily="34" charset="0"/>
+                  <a:cs typeface="Times New Roman" panose="02020603050405020304" pitchFamily="18" charset="0"/>
                   <a:hlinkClick r:id="rId10"/>
                 </a:rPr>
-                <a:t>https://www.statmethods.net/input/missingdata.html</a:t>
+                <a:t>http://www.r-tutor.com/elementary-statistics/numerical-measures/interquartile-range</a:t>
               </a:r>
-              <a:endParaRPr lang="en-US" sz="3600" dirty="0">
-                <a:solidFill>
-                  <a:schemeClr val="tx1"/>
-                </a:solidFill>
+              <a:endParaRPr lang="en-IN" sz="3600" dirty="0">
+                <a:effectLst/>
                 <a:latin typeface="+mj-lt"/>
-                <a:ea typeface="Verdana" pitchFamily="-108" charset="0"/>
-                <a:cs typeface="Verdana" pitchFamily="-108" charset="0"/>
-                <a:sym typeface="Verdana" pitchFamily="-108" charset="0"/>
-              </a:endParaRPr>
-            </a:p>
-            <a:p>
-              <a:pPr marL="457200" indent="-457200" algn="just">
-                <a:lnSpc>
-                  <a:spcPct val="110000"/>
-                </a:lnSpc>
-                <a:buFont typeface="Wingdings" panose="05000000000000000000" pitchFamily="2" charset="2"/>
-                <a:buChar char="Ø"/>
-                <a:tabLst>
-                  <a:tab pos="163281" algn="l"/>
-                  <a:tab pos="327298" algn="l"/>
-                  <a:tab pos="491309" algn="l"/>
-                  <a:tab pos="655325" algn="l"/>
-                  <a:tab pos="819336" algn="l"/>
-                  <a:tab pos="983353" algn="l"/>
-                  <a:tab pos="1147363" algn="l"/>
-                  <a:tab pos="1311379" algn="l"/>
-                  <a:tab pos="1475396" algn="l"/>
-                  <a:tab pos="1639406" algn="l"/>
-                  <a:tab pos="1803423" algn="l"/>
-                  <a:tab pos="1967434" algn="l"/>
-                </a:tabLst>
-              </a:pPr>
-              <a:r>
-                <a:rPr lang="en-US" sz="3600" dirty="0">
-                  <a:solidFill>
-                    <a:schemeClr val="tx1"/>
-                  </a:solidFill>
-                  <a:latin typeface="+mj-lt"/>
-                  <a:ea typeface="Verdana" pitchFamily="-108" charset="0"/>
-                  <a:cs typeface="Verdana" pitchFamily="-108" charset="0"/>
-                  <a:sym typeface="Verdana" pitchFamily="-108" charset="0"/>
-                </a:rPr>
-                <a:t>Visualization in R: </a:t>
-              </a:r>
-              <a:r>
-                <a:rPr lang="en-US" sz="3600" dirty="0">
-                  <a:solidFill>
-                    <a:schemeClr val="tx1"/>
-                  </a:solidFill>
-                  <a:latin typeface="+mj-lt"/>
-                  <a:ea typeface="Verdana" pitchFamily="-108" charset="0"/>
-                  <a:cs typeface="Verdana" pitchFamily="-108" charset="0"/>
-                  <a:sym typeface="Verdana" pitchFamily="-108" charset="0"/>
-                  <a:hlinkClick r:id="rId11"/>
-                </a:rPr>
-                <a:t>https://www.analyticsvidhya.com/blog/2015/07/guide-data-visualization-r/</a:t>
-              </a:r>
-              <a:endParaRPr lang="en-US" sz="3600" dirty="0">
-                <a:solidFill>
-                  <a:schemeClr val="tx1"/>
-                </a:solidFill>
-                <a:latin typeface="+mj-lt"/>
-                <a:ea typeface="Verdana" pitchFamily="-108" charset="0"/>
-                <a:cs typeface="Verdana" pitchFamily="-108" charset="0"/>
-                <a:sym typeface="Verdana" pitchFamily="-108" charset="0"/>
+                <a:ea typeface="Calibri" panose="020F0502020204030204" pitchFamily="34" charset="0"/>
+                <a:cs typeface="Times New Roman" panose="02020603050405020304" pitchFamily="18" charset="0"/>
               </a:endParaRPr>
             </a:p>
           </p:txBody>
@@ -10372,7 +10297,7 @@
           <p:nvPr/>
         </p:nvPicPr>
         <p:blipFill>
-          <a:blip r:embed="rId12"/>
+          <a:blip r:embed="rId11"/>
           <a:stretch>
             <a:fillRect/>
           </a:stretch>
@@ -10844,7 +10769,7 @@
         </p:xfrm>
         <a:graphic>
           <a:graphicData uri="http://schemas.openxmlformats.org/drawingml/2006/diagram">
-            <dgm:relIds xmlns:dgm="http://schemas.openxmlformats.org/drawingml/2006/diagram" xmlns:r="http://schemas.openxmlformats.org/officeDocument/2006/relationships" r:dm="rId13" r:lo="rId14" r:qs="rId15" r:cs="rId16"/>
+            <dgm:relIds xmlns:dgm="http://schemas.openxmlformats.org/drawingml/2006/diagram" xmlns:r="http://schemas.openxmlformats.org/officeDocument/2006/relationships" r:dm="rId12" r:lo="rId13" r:qs="rId14" r:cs="rId15"/>
           </a:graphicData>
         </a:graphic>
       </p:graphicFrame>
@@ -10863,7 +10788,7 @@
           <p:nvPr/>
         </p:nvPicPr>
         <p:blipFill>
-          <a:blip r:embed="rId18"/>
+          <a:blip r:embed="rId17"/>
           <a:stretch>
             <a:fillRect/>
           </a:stretch>
@@ -10893,7 +10818,7 @@
           <p:nvPr/>
         </p:nvPicPr>
         <p:blipFill>
-          <a:blip r:embed="rId19"/>
+          <a:blip r:embed="rId18"/>
           <a:stretch>
             <a:fillRect/>
           </a:stretch>
@@ -10986,7 +10911,7 @@
           <p:nvPr/>
         </p:nvPicPr>
         <p:blipFill rotWithShape="1">
-          <a:blip r:embed="rId20"/>
+          <a:blip r:embed="rId19"/>
           <a:srcRect t="4240"/>
           <a:stretch/>
         </p:blipFill>
@@ -11451,8 +11376,25 @@
                 <a:latin typeface="+mj-lt"/>
                 <a:cs typeface="Arial" panose="020B0604020202020204" pitchFamily="34" charset="0"/>
               </a:rPr>
-              <a:t>K-Nearest Neighbors</a:t>
+              <a:t>K-Nearest </a:t>
             </a:r>
+            <a:r>
+              <a:rPr lang="en-US" sz="3600" dirty="0" err="1">
+                <a:solidFill>
+                  <a:schemeClr val="tx1"/>
+                </a:solidFill>
+                <a:latin typeface="+mj-lt"/>
+                <a:cs typeface="Arial" panose="020B0604020202020204" pitchFamily="34" charset="0"/>
+              </a:rPr>
+              <a:t>Neighbours</a:t>
+            </a:r>
+            <a:endParaRPr lang="en-US" sz="3600" dirty="0">
+              <a:solidFill>
+                <a:schemeClr val="tx1"/>
+              </a:solidFill>
+              <a:latin typeface="+mj-lt"/>
+              <a:cs typeface="Arial" panose="020B0604020202020204" pitchFamily="34" charset="0"/>
+            </a:endParaRPr>
           </a:p>
           <a:p>
             <a:pPr marL="975463" lvl="1" indent="-571500" algn="just">

</xml_diff>